<commit_message>
enhance pptx generation with date placeholder replacement
</commit_message>
<xml_diff>
--- a/input/ac-terms-and-uf-terms.pptx
+++ b/input/ac-terms-and-uf-terms.pptx
@@ -4,6 +4,9 @@
   <p:sldMasterIdLst>
     <p:sldMasterId id="2147483648" r:id="rId1"/>
   </p:sldMasterIdLst>
+  <p:notesMasterIdLst>
+    <p:notesMasterId r:id="rId8"/>
+  </p:notesMasterIdLst>
   <p:sldIdLst>
     <p:sldId id="256" r:id="rId2"/>
     <p:sldId id="257" r:id="rId3"/>
@@ -12,11 +15,8 @@
     <p:sldId id="260" r:id="rId6"/>
     <p:sldId id="261" r:id="rId7"/>
   </p:sldIdLst>
-  <p:notesMasterIdLst>
-    <p:notesMasterId r:id="rId8"/>
-  </p:notesMasterIdLst>
-  <p:sldSz cx="7557059" cy="10693908"/>
-  <p:notesSz cx="10693908" cy="7557059"/>
+  <p:sldSz cx="7556500" cy="10693400"/>
+  <p:notesSz cx="10693400" cy="7556500"/>
   <p:defaultTextStyle>
     <a:lvl1pPr marL="0" algn="l" defTabSz="914400" rtl="0" eaLnBrk="1" latinLnBrk="0" hangingPunct="1">
       <a:defRPr sz="1800" kern="1200">
@@ -109,6 +109,11 @@
       </a:defRPr>
     </a:lvl9pPr>
   </p:defaultTextStyle>
+  <p:extLst>
+    <p:ext uri="{EFAFB233-063F-42B5-8137-9DF3F51BA10A}">
+      <p15:sldGuideLst xmlns:p15="http://schemas.microsoft.com/office/powerpoint/2012/main"/>
+    </p:ext>
+  </p:extLst>
 </p:presentation>
 </file>
 
@@ -134,234 +139,10 @@
           <a:chExt cx="0" cy="0"/>
         </a:xfrm>
       </p:grpSpPr>
-      <p:sp>
-        <p:nvSpPr>
-          <p:cNvPr id="2" name="Header Placeholder 1"/>
-          <p:cNvSpPr>
-            <a:spLocks noGrp="1"/>
-          </p:cNvSpPr>
-          <p:nvPr>
-            <p:ph type="hdr" sz="quarter"/>
-          </p:nvPr>
-        </p:nvSpPr>
-        <p:spPr>
-          <a:xfrm>
-            <a:off x="0" y="0"/>
-            <a:ext cx="2971800" cy="458788"/>
-          </a:xfrm>
-          <a:prstGeom prst="rect">
-            <a:avLst/>
-          </a:prstGeom>
-        </p:spPr>
-        <p:txBody>
-          <a:bodyPr vert="horz" lIns="91440" tIns="45720" rIns="91440" bIns="45720" rtlCol="0"/>
-          <a:lstStyle>
-            <a:lvl1pPr algn="l">
-              <a:defRPr sz="1200"/>
-            </a:lvl1pPr>
-          </a:lstStyle>
-          <a:p>
-            <a:endParaRPr lang="en-US"/>
-          </a:p>
-        </p:txBody>
-      </p:sp>
-      <p:sp>
-        <p:nvSpPr>
-          <p:cNvPr id="3" name="Date Placeholder 2"/>
-          <p:cNvSpPr>
-            <a:spLocks noGrp="1"/>
-          </p:cNvSpPr>
-          <p:nvPr>
-            <p:ph type="dt" idx="1"/>
-          </p:nvPr>
-        </p:nvSpPr>
-        <p:spPr>
-          <a:xfrm>
-            <a:off x="3884613" y="0"/>
-            <a:ext cx="2971800" cy="458788"/>
-          </a:xfrm>
-          <a:prstGeom prst="rect">
-            <a:avLst/>
-          </a:prstGeom>
-        </p:spPr>
-        <p:txBody>
-          <a:bodyPr vert="horz" lIns="91440" tIns="45720" rIns="91440" bIns="45720" rtlCol="0"/>
-          <a:lstStyle>
-            <a:lvl1pPr algn="r">
-              <a:defRPr sz="1200"/>
-            </a:lvl1pPr>
-          </a:lstStyle>
-          <a:p>
-            <a:fld id="{5282F153-3F37-0F45-9E97-73ACFA13230C}" type="datetimeFigureOut">
-              <a:rPr lang="en-US"/>
-              <a:t>7/23/19</a:t>
-            </a:fld>
-            <a:endParaRPr lang="en-US"/>
-          </a:p>
-        </p:txBody>
-      </p:sp>
-      <p:sp>
-        <p:nvSpPr>
-          <p:cNvPr id="4" name="Slide Image Placeholder 3"/>
-          <p:cNvSpPr>
-            <a:spLocks noGrp="1" noRot="1" noChangeAspect="1"/>
-          </p:cNvSpPr>
-          <p:nvPr>
-            <p:ph type="sldImg" idx="2"/>
-          </p:nvPr>
-        </p:nvSpPr>
-        <p:spPr>
-          <a:xfrm>
-            <a:off x="685800" y="1143000"/>
-            <a:ext cx="5486400" cy="3086100"/>
-          </a:xfrm>
-          <a:prstGeom prst="rect">
-            <a:avLst/>
-          </a:prstGeom>
-          <a:noFill/>
-          <a:ln w="12700">
-            <a:solidFill>
-              <a:prstClr val="black"/>
-            </a:solidFill>
-          </a:ln>
-        </p:spPr>
-        <p:txBody>
-          <a:bodyPr vert="horz" lIns="91440" tIns="45720" rIns="91440" bIns="45720" rtlCol="0" anchor="ctr"/>
-          <a:lstStyle/>
-          <a:p>
-            <a:endParaRPr lang="en-US"/>
-          </a:p>
-        </p:txBody>
-      </p:sp>
-      <p:sp>
-        <p:nvSpPr>
-          <p:cNvPr id="5" name="Notes Placeholder 4"/>
-          <p:cNvSpPr>
-            <a:spLocks noGrp="1"/>
-          </p:cNvSpPr>
-          <p:nvPr>
-            <p:ph type="body" sz="quarter" idx="3"/>
-          </p:nvPr>
-        </p:nvSpPr>
-        <p:spPr>
-          <a:xfrm>
-            <a:off x="685800" y="4400550"/>
-            <a:ext cx="5486400" cy="3600450"/>
-          </a:xfrm>
-          <a:prstGeom prst="rect">
-            <a:avLst/>
-          </a:prstGeom>
-        </p:spPr>
-        <p:txBody>
-          <a:bodyPr vert="horz" lIns="91440" tIns="45720" rIns="91440" bIns="45720" rtlCol="0"/>
-          <a:lstStyle/>
-          <a:p>
-            <a:pPr lvl="0"/>
-            <a:r>
-              <a:rPr lang="en-US"/>
-              <a:t>Click to edit Master text styles</a:t>
-            </a:r>
-          </a:p>
-          <a:p>
-            <a:pPr lvl="1"/>
-            <a:r>
-              <a:rPr lang="en-US"/>
-              <a:t>Second level</a:t>
-            </a:r>
-          </a:p>
-          <a:p>
-            <a:pPr lvl="2"/>
-            <a:r>
-              <a:rPr lang="en-US"/>
-              <a:t>Third level</a:t>
-            </a:r>
-          </a:p>
-          <a:p>
-            <a:pPr lvl="3"/>
-            <a:r>
-              <a:rPr lang="en-US"/>
-              <a:t>Fourth level</a:t>
-            </a:r>
-          </a:p>
-          <a:p>
-            <a:pPr lvl="4"/>
-            <a:r>
-              <a:rPr lang="en-US"/>
-              <a:t>Fifth level</a:t>
-            </a:r>
-          </a:p>
-        </p:txBody>
-      </p:sp>
-      <p:sp>
-        <p:nvSpPr>
-          <p:cNvPr id="6" name="Footer Placeholder 5"/>
-          <p:cNvSpPr>
-            <a:spLocks noGrp="1"/>
-          </p:cNvSpPr>
-          <p:nvPr>
-            <p:ph type="ftr" sz="quarter" idx="4"/>
-          </p:nvPr>
-        </p:nvSpPr>
-        <p:spPr>
-          <a:xfrm>
-            <a:off x="0" y="8685213"/>
-            <a:ext cx="2971800" cy="458787"/>
-          </a:xfrm>
-          <a:prstGeom prst="rect">
-            <a:avLst/>
-          </a:prstGeom>
-        </p:spPr>
-        <p:txBody>
-          <a:bodyPr vert="horz" lIns="91440" tIns="45720" rIns="91440" bIns="45720" rtlCol="0" anchor="b"/>
-          <a:lstStyle>
-            <a:lvl1pPr algn="l">
-              <a:defRPr sz="1200"/>
-            </a:lvl1pPr>
-          </a:lstStyle>
-          <a:p>
-            <a:endParaRPr lang="en-US"/>
-          </a:p>
-        </p:txBody>
-      </p:sp>
-      <p:sp>
-        <p:nvSpPr>
-          <p:cNvPr id="7" name="Slide Number Placeholder 6"/>
-          <p:cNvSpPr>
-            <a:spLocks noGrp="1"/>
-          </p:cNvSpPr>
-          <p:nvPr>
-            <p:ph type="sldNum" sz="quarter" idx="5"/>
-          </p:nvPr>
-        </p:nvSpPr>
-        <p:spPr>
-          <a:xfrm>
-            <a:off x="3884613" y="8685213"/>
-            <a:ext cx="2971800" cy="458787"/>
-          </a:xfrm>
-          <a:prstGeom prst="rect">
-            <a:avLst/>
-          </a:prstGeom>
-        </p:spPr>
-        <p:txBody>
-          <a:bodyPr vert="horz" lIns="91440" tIns="45720" rIns="91440" bIns="45720" rtlCol="0" anchor="b"/>
-          <a:lstStyle>
-            <a:lvl1pPr algn="r">
-              <a:defRPr sz="1200"/>
-            </a:lvl1pPr>
-          </a:lstStyle>
-          <a:p>
-            <a:fld id="{CE5E9CC1-C706-0F49-92D6-E571CC5EEA8F}" type="slidenum">
-              <a:rPr lang="en-US"/>
-              <a:t>‹#›</a:t>
-            </a:fld>
-            <a:endParaRPr lang="en-US"/>
-          </a:p>
-        </p:txBody>
-      </p:sp>
     </p:spTree>
     <p:extLst>
       <p:ext uri="{BB962C8B-B14F-4D97-AF65-F5344CB8AC3E}">
-        <p14:creationId xmlns:p14="http://schemas.microsoft.com/office/powerpoint/2010/main" val="1024086991"/>
+        <p14:creationId xmlns:p14="http://schemas.microsoft.com/office/powerpoint/2010/main" val="4113326111"/>
       </p:ext>
     </p:extLst>
   </p:cSld>
@@ -505,10 +286,6 @@
           <a:bodyPr/>
           <a:lstStyle/>
           <a:p>
-            <a:r>
-              <a:rPr lang="en-US" dirty="0"/>
-              <a:t/>
-            </a:r>
             <a:endParaRPr lang="en-US" dirty="0"/>
           </a:p>
         </p:txBody>
@@ -593,10 +370,6 @@
           <a:bodyPr/>
           <a:lstStyle/>
           <a:p>
-            <a:r>
-              <a:rPr lang="en-US" dirty="0"/>
-              <a:t/>
-            </a:r>
             <a:endParaRPr lang="en-US" dirty="0"/>
           </a:p>
         </p:txBody>
@@ -681,10 +454,6 @@
           <a:bodyPr/>
           <a:lstStyle/>
           <a:p>
-            <a:r>
-              <a:rPr lang="en-US" dirty="0"/>
-              <a:t/>
-            </a:r>
             <a:endParaRPr lang="en-US" dirty="0"/>
           </a:p>
         </p:txBody>
@@ -769,10 +538,6 @@
           <a:bodyPr/>
           <a:lstStyle/>
           <a:p>
-            <a:r>
-              <a:rPr lang="en-US" dirty="0"/>
-              <a:t/>
-            </a:r>
             <a:endParaRPr lang="en-US" dirty="0"/>
           </a:p>
         </p:txBody>
@@ -857,10 +622,6 @@
           <a:bodyPr/>
           <a:lstStyle/>
           <a:p>
-            <a:r>
-              <a:rPr lang="en-US" dirty="0"/>
-              <a:t/>
-            </a:r>
             <a:endParaRPr lang="en-US" dirty="0"/>
           </a:p>
         </p:txBody>
@@ -945,10 +706,6 @@
           <a:bodyPr/>
           <a:lstStyle/>
           <a:p>
-            <a:r>
-              <a:rPr lang="en-US" dirty="0"/>
-              <a:t/>
-            </a:r>
             <a:endParaRPr lang="en-US" dirty="0"/>
           </a:p>
         </p:txBody>
@@ -1022,6 +779,11 @@
 <file path=ppt/slideMasters/slideMaster1.xml><?xml version="1.0" encoding="utf-8"?>
 <p:sldMaster xmlns:a="http://schemas.openxmlformats.org/drawingml/2006/main" xmlns:r="http://schemas.openxmlformats.org/officeDocument/2006/relationships" xmlns:p="http://schemas.openxmlformats.org/presentationml/2006/main">
   <p:cSld>
+    <p:bg>
+      <p:bgRef idx="1001">
+        <a:schemeClr val="bg1"/>
+      </p:bgRef>
+    </p:bg>
     <p:spTree>
       <p:nvGrpSpPr>
         <p:cNvPr id="1" name=""/>
@@ -1304,6 +1066,7 @@
         <a:solidFill>
           <a:srgbClr val="FFFFFF"/>
         </a:solidFill>
+        <a:effectLst/>
       </p:bgPr>
     </p:bg>
     <p:spTree>
@@ -1322,14 +1085,14 @@
       </p:grpSpPr>
       <p:pic>
         <p:nvPicPr>
-          <p:cNvPr id="2" name="Image 0" descr="preencoded.png">    </p:cNvPr>
+          <p:cNvPr id="2" name="Image 0" descr="preencoded.png"/>
           <p:cNvPicPr>
             <a:picLocks noChangeAspect="1"/>
           </p:cNvPicPr>
           <p:nvPr/>
         </p:nvPicPr>
         <p:blipFill>
-          <a:blip r:embed="rId1"/>
+          <a:blip r:embed="rId3"/>
           <a:stretch>
             <a:fillRect/>
           </a:stretch>
@@ -1365,7 +1128,7 @@
           <a:bodyPr wrap="square" rtlCol="0" anchor="ctr"/>
           <a:lstStyle/>
           <a:p>
-            <a:pPr algn="l" indent="0" marL="0">
+            <a:pPr marL="0" indent="0" algn="l">
               <a:buNone/>
             </a:pPr>
             <a:r>
@@ -1382,7 +1145,7 @@
             <a:endParaRPr lang="en-US" sz="1400" dirty="0"/>
           </a:p>
           <a:p>
-            <a:pPr algn="l" indent="0" marL="0">
+            <a:pPr marL="0" indent="0" algn="l">
               <a:buNone/>
             </a:pPr>
             <a:r>
@@ -1402,7 +1165,7 @@
       </p:sp>
       <p:sp>
         <p:nvSpPr>
-          <p:cNvPr id="4" name="Text 1"/>
+          <p:cNvPr id="4" name="Text 1" descr="DATE_PLACEHOLDER"/>
           <p:cNvSpPr/>
           <p:nvPr/>
         </p:nvSpPr>
@@ -1421,7 +1184,7 @@
           <a:bodyPr wrap="square" rtlCol="0" anchor="ctr"/>
           <a:lstStyle/>
           <a:p>
-            <a:pPr algn="l" indent="0" marL="0">
+            <a:pPr marL="0" indent="0" algn="l">
               <a:buNone/>
             </a:pPr>
             <a:r>
@@ -1460,7 +1223,7 @@
           <a:bodyPr wrap="square" rtlCol="0" anchor="ctr"/>
           <a:lstStyle/>
           <a:p>
-            <a:pPr algn="l" indent="0" marL="0">
+            <a:pPr marL="0" indent="0" algn="l">
               <a:buNone/>
             </a:pPr>
             <a:r>
@@ -1500,10 +1263,17 @@
             <a:prstDash val="solid"/>
           </a:ln>
         </p:spPr>
+        <p:txBody>
+          <a:bodyPr/>
+          <a:lstStyle/>
+          <a:p>
+            <a:endParaRPr lang="pt-BR"/>
+          </a:p>
+        </p:txBody>
       </p:sp>
       <p:graphicFrame>
         <p:nvGraphicFramePr>
-          <p:cNvPr id="2" name="Table 0"/>
+          <p:cNvPr id="7" name="Table 0"/>
           <p:cNvGraphicFramePr>
             <a:graphicFrameLocks noGrp="1"/>
           </p:cNvGraphicFramePr>
@@ -1517,24 +1287,42 @@
         </p:nvGraphicFramePr>
         <p:xfrm>
           <a:off x="274320" y="10149840"/>
-          <a:ext cx="7557059" cy="91440"/>
+          <a:ext cx="6949440" cy="213360"/>
         </p:xfrm>
         <a:graphic>
           <a:graphicData uri="http://schemas.openxmlformats.org/drawingml/2006/table">
             <a:tbl>
               <a:tblPr/>
               <a:tblGrid>
-                <a:gridCol w="2011680"/>
-                <a:gridCol w="2926080"/>
-                <a:gridCol w="2011680"/>
+                <a:gridCol w="2011680">
+                  <a:extLst>
+                    <a:ext uri="{9D8B030D-6E8A-4147-A177-3AD203B41FA5}">
+                      <a16:colId xmlns:a16="http://schemas.microsoft.com/office/drawing/2014/main" val="20000"/>
+                    </a:ext>
+                  </a:extLst>
+                </a:gridCol>
+                <a:gridCol w="2926080">
+                  <a:extLst>
+                    <a:ext uri="{9D8B030D-6E8A-4147-A177-3AD203B41FA5}">
+                      <a16:colId xmlns:a16="http://schemas.microsoft.com/office/drawing/2014/main" val="20001"/>
+                    </a:ext>
+                  </a:extLst>
+                </a:gridCol>
+                <a:gridCol w="2011680">
+                  <a:extLst>
+                    <a:ext uri="{9D8B030D-6E8A-4147-A177-3AD203B41FA5}">
+                      <a16:colId xmlns:a16="http://schemas.microsoft.com/office/drawing/2014/main" val="20002"/>
+                    </a:ext>
+                  </a:extLst>
+                </a:gridCol>
               </a:tblGrid>
-              <a:tr h="91440">
+              <a:tr h="0">
                 <a:tc>
                   <a:txBody>
                     <a:bodyPr/>
                     <a:lstStyle/>
                     <a:p>
-                      <a:pPr algn="l" indent="0" marL="0">
+                      <a:pPr marL="0" indent="0" algn="l">
                         <a:buNone/>
                       </a:pPr>
                       <a:r>
@@ -1555,7 +1343,7 @@
                       </a:endParaRPr>
                     </a:p>
                   </a:txBody>
-                  <a:tcPr marL="91440" marR="91440" marT="45720" marB="45720">
+                  <a:tcPr>
                     <a:lnL w="0" cap="flat" cmpd="sng" algn="ctr">
                       <a:noFill/>
                     </a:lnL>
@@ -1575,7 +1363,7 @@
                     <a:bodyPr/>
                     <a:lstStyle/>
                     <a:p>
-                      <a:pPr algn="ctr" indent="0" marL="0">
+                      <a:pPr marL="0" indent="0" algn="ctr">
                         <a:buNone/>
                       </a:pPr>
                       <a:r>
@@ -1596,7 +1384,7 @@
                       </a:endParaRPr>
                     </a:p>
                   </a:txBody>
-                  <a:tcPr marL="91440" marR="91440" marT="45720" marB="45720">
+                  <a:tcPr>
                     <a:lnL w="0" cap="flat" cmpd="sng" algn="ctr">
                       <a:noFill/>
                     </a:lnL>
@@ -1616,7 +1404,7 @@
                     <a:bodyPr/>
                     <a:lstStyle/>
                     <a:p>
-                      <a:pPr algn="r" indent="0" marL="0">
+                      <a:pPr marL="0" indent="0" algn="r">
                         <a:buNone/>
                       </a:pPr>
                       <a:r>
@@ -1627,7 +1415,7 @@
                           <a:latin typeface="Metropolis" pitchFamily="34" charset="0"/>
                           <a:ea typeface="Metropolis" pitchFamily="34" charset="-122"/>
                           <a:cs typeface="Metropolis" pitchFamily="34" charset="-120"/>
-                          <a:hlinkClick r:id="rId2" invalidUrl="" action="" tgtFrame="" tooltip="" history="1" highlightClick="0" endSnd="0">
+                          <a:hlinkClick r:id="rId4">
                             <a:extLst>
                               <a:ext uri="{A12FA001-AC4F-418D-AE19-62706E023703}">
                                 <ahyp:hlinkClr xmlns:ahyp="http://schemas.microsoft.com/office/drawing/2018/hyperlinkcolor" val="tx"/>
@@ -1637,9 +1425,6 @@
                         </a:rPr>
                         <a:t>www.icapital.com</a:t>
                       </a:r>
-                      <a:pPr algn="r" indent="0" marL="0">
-                        <a:buNone/>
-                      </a:pPr>
                       <a:r>
                         <a:rPr lang="en-US" sz="800" dirty="0">
                           <a:solidFill>
@@ -1658,7 +1443,7 @@
                       </a:endParaRPr>
                     </a:p>
                   </a:txBody>
-                  <a:tcPr marL="91440" marR="91440" marT="45720" marB="45720">
+                  <a:tcPr>
                     <a:lnL w="0" cap="flat" cmpd="sng" algn="ctr">
                       <a:noFill/>
                     </a:lnL>
@@ -1673,6 +1458,11 @@
                     </a:lnB>
                   </a:tcPr>
                 </a:tc>
+                <a:extLst>
+                  <a:ext uri="{0D108BD9-81ED-4DB2-BD59-A6C34878D82A}">
+                    <a16:rowId xmlns:a16="http://schemas.microsoft.com/office/drawing/2014/main" val="10000"/>
+                  </a:ext>
+                </a:extLst>
               </a:tr>
             </a:tbl>
           </a:graphicData>
@@ -1701,7 +1491,7 @@
           <a:bodyPr wrap="square" rtlCol="0" anchor="ctr"/>
           <a:lstStyle/>
           <a:p>
-            <a:pPr algn="l" indent="0" marL="0">
+            <a:pPr marL="0" indent="0" algn="l">
               <a:buNone/>
             </a:pPr>
             <a:r>
@@ -1742,7 +1532,7 @@
           <a:bodyPr wrap="square" rtlCol="0" anchor="ctr"/>
           <a:lstStyle/>
           <a:p>
-            <a:pPr algn="l" indent="0" marL="0">
+            <a:pPr marL="0" indent="0" algn="l">
               <a:buNone/>
             </a:pPr>
             <a:r>
@@ -1781,7 +1571,7 @@
           <a:bodyPr wrap="square" rtlCol="0" anchor="ctr"/>
           <a:lstStyle/>
           <a:p>
-            <a:pPr algn="l" indent="0" marL="0">
+            <a:pPr marL="0" indent="0" algn="l">
               <a:buNone/>
             </a:pPr>
             <a:r>
@@ -1820,7 +1610,7 @@
           <a:bodyPr wrap="square" rtlCol="0" anchor="ctr"/>
           <a:lstStyle/>
           <a:p>
-            <a:pPr algn="l" indent="0" marL="0">
+            <a:pPr marL="0" indent="0" algn="l">
               <a:buNone/>
             </a:pPr>
             <a:r>
@@ -1835,9 +1625,6 @@
               <a:t>ACCESS FUND
 </a:t>
             </a:r>
-            <a:pPr algn="l" indent="0" marL="0">
-              <a:buNone/>
-            </a:pPr>
             <a:r>
               <a:rPr lang="en-US" sz="1000" dirty="0">
                 <a:solidFill>
@@ -1874,7 +1661,7 @@
           <a:bodyPr wrap="square" rtlCol="0" anchor="ctr"/>
           <a:lstStyle/>
           <a:p>
-            <a:pPr algn="l" indent="0" marL="0">
+            <a:pPr marL="0" indent="0" algn="l">
               <a:buNone/>
             </a:pPr>
             <a:r>
@@ -1889,9 +1676,6 @@
               <a:t>INVESTMENT MANAGER
 </a:t>
             </a:r>
-            <a:pPr algn="l" indent="0" marL="0">
-              <a:buNone/>
-            </a:pPr>
             <a:r>
               <a:rPr lang="en-US" sz="1000" dirty="0">
                 <a:solidFill>
@@ -1928,7 +1712,7 @@
           <a:bodyPr wrap="square" rtlCol="0" anchor="ctr"/>
           <a:lstStyle/>
           <a:p>
-            <a:pPr algn="l" indent="0" marL="0">
+            <a:pPr marL="0" indent="0" algn="l">
               <a:buNone/>
             </a:pPr>
             <a:r>
@@ -1943,9 +1727,6 @@
               <a:t>SUBSCRIPTION FREQUENCY
 </a:t>
             </a:r>
-            <a:pPr algn="l" indent="0" marL="0">
-              <a:buNone/>
-            </a:pPr>
             <a:r>
               <a:rPr lang="en-US" sz="1000" dirty="0">
                 <a:solidFill>
@@ -1982,7 +1763,7 @@
           <a:bodyPr wrap="square" rtlCol="0" anchor="ctr"/>
           <a:lstStyle/>
           <a:p>
-            <a:pPr algn="just" indent="0" marL="0">
+            <a:pPr marL="0" indent="0" algn="just">
               <a:buNone/>
             </a:pPr>
             <a:r>
@@ -1997,9 +1778,6 @@
               <a:t>ACCESS FUND FEES
 </a:t>
             </a:r>
-            <a:pPr algn="just" indent="0" marL="0">
-              <a:buNone/>
-            </a:pPr>
             <a:r>
               <a:rPr lang="en-US" sz="1000" b="1" dirty="0">
                 <a:solidFill>
@@ -2011,9 +1789,6 @@
               </a:rPr>
               <a:t>Class I: </a:t>
             </a:r>
-            <a:pPr algn="just" indent="0" marL="0">
-              <a:buNone/>
-            </a:pPr>
             <a:r>
               <a:rPr lang="en-US" sz="1000" dirty="0">
                 <a:solidFill>
@@ -2028,7 +1803,7 @@
             <a:endParaRPr lang="en-US" sz="1000" dirty="0"/>
           </a:p>
           <a:p>
-            <a:pPr algn="just" indent="0" marL="0">
+            <a:pPr marL="0" indent="0" algn="just">
               <a:buNone/>
             </a:pPr>
             <a:r>
@@ -2042,9 +1817,6 @@
               </a:rPr>
               <a:t>Class A: </a:t>
             </a:r>
-            <a:pPr algn="just" indent="0" marL="0">
-              <a:buNone/>
-            </a:pPr>
             <a:r>
               <a:rPr lang="en-US" sz="1000" dirty="0">
                 <a:solidFill>
@@ -2059,7 +1831,7 @@
             <a:endParaRPr lang="en-US" sz="1000" dirty="0"/>
           </a:p>
           <a:p>
-            <a:pPr algn="just" indent="0" marL="0">
+            <a:pPr marL="0" indent="0" algn="just">
               <a:buNone/>
             </a:pPr>
             <a:r>
@@ -2073,9 +1845,6 @@
               </a:rPr>
               <a:t>Class B: </a:t>
             </a:r>
-            <a:pPr algn="just" indent="0" marL="0">
-              <a:buNone/>
-            </a:pPr>
             <a:r>
               <a:rPr lang="en-US" sz="1000" dirty="0">
                 <a:solidFill>
@@ -2112,7 +1881,7 @@
           <a:bodyPr wrap="square" rtlCol="0" anchor="ctr"/>
           <a:lstStyle/>
           <a:p>
-            <a:pPr algn="just" indent="0" marL="0">
+            <a:pPr marL="0" indent="0" algn="just">
               <a:buNone/>
             </a:pPr>
             <a:r>
@@ -2127,9 +1896,6 @@
               <a:t>CLIENT ELIGIBILITY
 </a:t>
             </a:r>
-            <a:pPr algn="just" indent="0" marL="0">
-              <a:buNone/>
-            </a:pPr>
             <a:r>
               <a:rPr lang="en-US" sz="1000" dirty="0">
                 <a:solidFill>
@@ -2166,7 +1932,7 @@
           <a:bodyPr wrap="square" rtlCol="0" anchor="ctr"/>
           <a:lstStyle/>
           <a:p>
-            <a:pPr algn="l" indent="0" marL="0">
+            <a:pPr marL="0" indent="0" algn="l">
               <a:buNone/>
             </a:pPr>
             <a:r>
@@ -2183,7 +1949,7 @@
             <a:endParaRPr lang="en-US" sz="1000" dirty="0"/>
           </a:p>
           <a:p>
-            <a:pPr algn="l" indent="0" marL="0">
+            <a:pPr marL="0" indent="0" algn="l">
               <a:spcAft>
                 <a:spcPts val="1000"/>
               </a:spcAft>
@@ -2203,7 +1969,7 @@
             <a:endParaRPr lang="en-US" sz="1000" dirty="0"/>
           </a:p>
           <a:p>
-            <a:pPr algn="l" indent="0" marL="0">
+            <a:pPr marL="0" indent="0" algn="l">
               <a:buNone/>
             </a:pPr>
             <a:r>
@@ -2218,9 +1984,6 @@
               <a:t>REDEMPTIONS
 </a:t>
             </a:r>
-            <a:pPr algn="l" indent="0" marL="0">
-              <a:buNone/>
-            </a:pPr>
             <a:r>
               <a:rPr lang="en-US" sz="1000" b="1" dirty="0">
                 <a:solidFill>
@@ -2235,7 +1998,7 @@
             <a:endParaRPr lang="en-US" sz="1000" dirty="0"/>
           </a:p>
           <a:p>
-            <a:pPr algn="l" marL="342900" indent="-342900">
+            <a:pPr marL="342900" indent="-342900" algn="l">
               <a:buSzPct val="100000"/>
               <a:buChar char="•"/>
             </a:pPr>
@@ -2250,65 +2013,185 @@
               </a:rPr>
               <a:t> </a:t>
             </a:r>
-            <a:pPr algn="l" marL="342900" indent="-342900">
+            <a:r>
+              <a:rPr lang="en-US" sz="1000" dirty="0">
+                <a:solidFill>
+                  <a:srgbClr val="2F4251"/>
+                </a:solidFill>
+                <a:latin typeface="Metropolis" pitchFamily="34" charset="0"/>
+                <a:ea typeface="Metropolis" pitchFamily="34" charset="-122"/>
+                <a:cs typeface="Metropolis" pitchFamily="34" charset="-120"/>
+              </a:rPr>
+              <a:t>Quarterly repurchases are expected to be made at the NAV per share as of last calendar day of each </a:t>
+            </a:r>
+            <a:r>
+              <a:rPr lang="en-US" sz="1000" dirty="0">
+                <a:solidFill>
+                  <a:srgbClr val="FFFFFF"/>
+                </a:solidFill>
+                <a:latin typeface="Metropolis" pitchFamily="34" charset="0"/>
+                <a:ea typeface="Metropolis" pitchFamily="34" charset="-122"/>
+                <a:cs typeface="Metropolis" pitchFamily="34" charset="-120"/>
+              </a:rPr>
+              <a:t>.</a:t>
+            </a:r>
+            <a:r>
+              <a:rPr lang="en-US" sz="1000" dirty="0">
+                <a:solidFill>
+                  <a:srgbClr val="2F4251"/>
+                </a:solidFill>
+                <a:latin typeface="Metropolis" pitchFamily="34" charset="0"/>
+                <a:ea typeface="Metropolis" pitchFamily="34" charset="-122"/>
+                <a:cs typeface="Metropolis" pitchFamily="34" charset="-120"/>
+              </a:rPr>
+              <a:t>calendar quarter (each a “Repurchase Date”).</a:t>
+            </a:r>
+            <a:endParaRPr lang="en-US" sz="1000" dirty="0"/>
+          </a:p>
+          <a:p>
+            <a:pPr marL="0" indent="0" algn="l">
+              <a:buNone/>
+            </a:pPr>
+            <a:endParaRPr lang="en-US" sz="1000" dirty="0"/>
+          </a:p>
+          <a:p>
+            <a:pPr marL="0" indent="0" algn="l">
+              <a:buNone/>
+            </a:pPr>
+            <a:r>
+              <a:rPr lang="en-US" sz="1000" b="1" dirty="0">
+                <a:solidFill>
+                  <a:srgbClr val="2F4251"/>
+                </a:solidFill>
+                <a:latin typeface="Metropolis" pitchFamily="34" charset="0"/>
+                <a:ea typeface="Metropolis" pitchFamily="34" charset="-122"/>
+                <a:cs typeface="Metropolis" pitchFamily="34" charset="-120"/>
+              </a:rPr>
+              <a:t>NOTICE PERIOD</a:t>
+            </a:r>
+            <a:endParaRPr lang="en-US" sz="1000" dirty="0"/>
+          </a:p>
+          <a:p>
+            <a:pPr marL="342900" indent="-342900" algn="l">
               <a:buSzPct val="100000"/>
               <a:buChar char="•"/>
             </a:pPr>
             <a:r>
-              <a:rPr lang="en-US" sz="1000" dirty="0">
-                <a:solidFill>
-                  <a:srgbClr val="2F4251"/>
+              <a:rPr lang="en-US" sz="800" dirty="0">
+                <a:solidFill>
+                  <a:srgbClr val="0077AA"/>
                 </a:solidFill>
                 <a:latin typeface="Metropolis" pitchFamily="34" charset="0"/>
                 <a:ea typeface="Metropolis" pitchFamily="34" charset="-122"/>
                 <a:cs typeface="Metropolis" pitchFamily="34" charset="-120"/>
               </a:rPr>
-              <a:t>Quarterly repurchases are expected to be made at the NAV per share as of last calendar day of each </a:t>
-            </a:r>
-            <a:pPr algn="l" marL="342900" indent="-342900">
+              <a:t> </a:t>
+            </a:r>
+            <a:r>
+              <a:rPr lang="en-US" sz="1000" dirty="0">
+                <a:solidFill>
+                  <a:srgbClr val="2F4251"/>
+                </a:solidFill>
+                <a:latin typeface="Metropolis" pitchFamily="34" charset="0"/>
+                <a:ea typeface="Metropolis" pitchFamily="34" charset="-122"/>
+                <a:cs typeface="Metropolis" pitchFamily="34" charset="-120"/>
+              </a:rPr>
+              <a:t>Repurchase requests must be received at least 80 calendar days prior to each Repurchase Date. </a:t>
+            </a:r>
+            <a:endParaRPr lang="en-US" sz="1000" dirty="0"/>
+          </a:p>
+          <a:p>
+            <a:pPr marL="342900" indent="-342900" algn="l">
               <a:buSzPct val="100000"/>
               <a:buChar char="•"/>
             </a:pPr>
             <a:r>
-              <a:rPr lang="en-US" sz="1000" dirty="0">
-                <a:solidFill>
-                  <a:srgbClr val="FFFFFF"/>
+              <a:rPr lang="en-US" sz="800" dirty="0">
+                <a:solidFill>
+                  <a:srgbClr val="0077AA"/>
                 </a:solidFill>
                 <a:latin typeface="Metropolis" pitchFamily="34" charset="0"/>
                 <a:ea typeface="Metropolis" pitchFamily="34" charset="-122"/>
                 <a:cs typeface="Metropolis" pitchFamily="34" charset="-120"/>
               </a:rPr>
+              <a:t> </a:t>
+            </a:r>
+            <a:r>
+              <a:rPr lang="en-US" sz="1000" dirty="0">
+                <a:solidFill>
+                  <a:srgbClr val="2F4251"/>
+                </a:solidFill>
+                <a:latin typeface="Metropolis" pitchFamily="34" charset="0"/>
+                <a:ea typeface="Metropolis" pitchFamily="34" charset="-122"/>
+                <a:cs typeface="Metropolis" pitchFamily="34" charset="-120"/>
+              </a:rPr>
+              <a:t>Repurchase requests are subject to acceptance by the Underlying Fund as well as the Underlying Fund's </a:t>
+            </a:r>
+            <a:r>
+              <a:rPr lang="en-US" sz="1000" dirty="0">
+                <a:solidFill>
+                  <a:srgbClr val="FFFFFF"/>
+                </a:solidFill>
+                <a:latin typeface="Metropolis" pitchFamily="34" charset="0"/>
+                <a:ea typeface="Metropolis" pitchFamily="34" charset="-122"/>
+                <a:cs typeface="Metropolis" pitchFamily="34" charset="-120"/>
+              </a:rPr>
               <a:t>.</a:t>
             </a:r>
-            <a:pPr algn="l" marL="342900" indent="-342900">
+            <a:r>
+              <a:rPr lang="en-US" sz="1000" dirty="0">
+                <a:solidFill>
+                  <a:srgbClr val="2F4251"/>
+                </a:solidFill>
+                <a:latin typeface="Metropolis" pitchFamily="34" charset="0"/>
+                <a:ea typeface="Metropolis" pitchFamily="34" charset="-122"/>
+                <a:cs typeface="Metropolis" pitchFamily="34" charset="-120"/>
+              </a:rPr>
+              <a:t>terms and conditions of such repurchase offers.</a:t>
+            </a:r>
+            <a:endParaRPr lang="en-US" sz="1000" dirty="0"/>
+          </a:p>
+          <a:p>
+            <a:pPr marL="0" indent="0" algn="l">
+              <a:buNone/>
+            </a:pPr>
+            <a:endParaRPr lang="en-US" sz="1000" dirty="0"/>
+          </a:p>
+          <a:p>
+            <a:pPr marL="0" indent="0" algn="l">
+              <a:buNone/>
+            </a:pPr>
+            <a:r>
+              <a:rPr lang="en-US" sz="1000" b="1" dirty="0">
+                <a:solidFill>
+                  <a:srgbClr val="2F4251"/>
+                </a:solidFill>
+                <a:latin typeface="Metropolis" pitchFamily="34" charset="0"/>
+                <a:ea typeface="Metropolis" pitchFamily="34" charset="-122"/>
+                <a:cs typeface="Metropolis" pitchFamily="34" charset="-120"/>
+              </a:rPr>
+              <a:t>REPURCHASE GATE</a:t>
+            </a:r>
+            <a:endParaRPr lang="en-US" sz="1000" dirty="0"/>
+          </a:p>
+          <a:p>
+            <a:pPr marL="342900" indent="-342900" algn="l">
               <a:buSzPct val="100000"/>
               <a:buChar char="•"/>
             </a:pPr>
             <a:r>
-              <a:rPr lang="en-US" sz="1000" dirty="0">
-                <a:solidFill>
-                  <a:srgbClr val="2F4251"/>
+              <a:rPr lang="en-US" sz="800" dirty="0">
+                <a:solidFill>
+                  <a:srgbClr val="0077AA"/>
                 </a:solidFill>
                 <a:latin typeface="Metropolis" pitchFamily="34" charset="0"/>
                 <a:ea typeface="Metropolis" pitchFamily="34" charset="-122"/>
                 <a:cs typeface="Metropolis" pitchFamily="34" charset="-120"/>
               </a:rPr>
-              <a:t>calendar quarter (each a “Repurchase Date”).</a:t>
-            </a:r>
-            <a:endParaRPr lang="en-US" sz="1000" dirty="0"/>
-          </a:p>
-          <a:p>
-            <a:pPr algn="l" indent="0" marL="0">
-              <a:buNone/>
-            </a:pPr>
-            <a:endParaRPr lang="en-US" sz="1000" dirty="0"/>
-          </a:p>
-          <a:p>
-            <a:pPr algn="l" indent="0" marL="0">
-              <a:buNone/>
-            </a:pPr>
-            <a:r>
-              <a:rPr lang="en-US" sz="1000" b="1" dirty="0">
+              <a:t> </a:t>
+            </a:r>
+            <a:r>
+              <a:rPr lang="en-US" sz="1000" dirty="0">
                 <a:solidFill>
                   <a:srgbClr val="2F4251"/>
                 </a:solidFill>
@@ -2316,181 +2199,19 @@
                 <a:ea typeface="Metropolis" pitchFamily="34" charset="-122"/>
                 <a:cs typeface="Metropolis" pitchFamily="34" charset="-120"/>
               </a:rPr>
-              <a:t>NOTICE PERIOD</a:t>
-            </a:r>
-            <a:endParaRPr lang="en-US" sz="1000" dirty="0"/>
-          </a:p>
-          <a:p>
-            <a:pPr algn="l" marL="342900" indent="-342900">
-              <a:buSzPct val="100000"/>
-              <a:buChar char="•"/>
-            </a:pPr>
-            <a:r>
-              <a:rPr lang="en-US" sz="800" dirty="0">
-                <a:solidFill>
-                  <a:srgbClr val="0077AA"/>
+              <a:t>Any shares held for less than one year are subject to a 2% early repurchase fee deduction.</a:t>
+            </a:r>
+            <a:r>
+              <a:rPr lang="en-US" sz="1000" dirty="0">
+                <a:solidFill>
+                  <a:srgbClr val="FFFFFF"/>
                 </a:solidFill>
                 <a:latin typeface="Metropolis" pitchFamily="34" charset="0"/>
                 <a:ea typeface="Metropolis" pitchFamily="34" charset="-122"/>
                 <a:cs typeface="Metropolis" pitchFamily="34" charset="-120"/>
               </a:rPr>
-              <a:t> </a:t>
-            </a:r>
-            <a:pPr algn="l" marL="342900" indent="-342900">
-              <a:buSzPct val="100000"/>
-              <a:buChar char="•"/>
-            </a:pPr>
-            <a:r>
-              <a:rPr lang="en-US" sz="1000" dirty="0">
-                <a:solidFill>
-                  <a:srgbClr val="2F4251"/>
-                </a:solidFill>
-                <a:latin typeface="Metropolis" pitchFamily="34" charset="0"/>
-                <a:ea typeface="Metropolis" pitchFamily="34" charset="-122"/>
-                <a:cs typeface="Metropolis" pitchFamily="34" charset="-120"/>
-              </a:rPr>
-              <a:t>Repurchase requests must be received at least 80 calendar days prior to each Repurchase Date. </a:t>
-            </a:r>
-            <a:endParaRPr lang="en-US" sz="1000" dirty="0"/>
-          </a:p>
-          <a:p>
-            <a:pPr algn="l" marL="342900" indent="-342900">
-              <a:buSzPct val="100000"/>
-              <a:buChar char="•"/>
-            </a:pPr>
-            <a:r>
-              <a:rPr lang="en-US" sz="800" dirty="0">
-                <a:solidFill>
-                  <a:srgbClr val="0077AA"/>
-                </a:solidFill>
-                <a:latin typeface="Metropolis" pitchFamily="34" charset="0"/>
-                <a:ea typeface="Metropolis" pitchFamily="34" charset="-122"/>
-                <a:cs typeface="Metropolis" pitchFamily="34" charset="-120"/>
-              </a:rPr>
-              <a:t> </a:t>
-            </a:r>
-            <a:pPr algn="l" marL="342900" indent="-342900">
-              <a:buSzPct val="100000"/>
-              <a:buChar char="•"/>
-            </a:pPr>
-            <a:r>
-              <a:rPr lang="en-US" sz="1000" dirty="0">
-                <a:solidFill>
-                  <a:srgbClr val="2F4251"/>
-                </a:solidFill>
-                <a:latin typeface="Metropolis" pitchFamily="34" charset="0"/>
-                <a:ea typeface="Metropolis" pitchFamily="34" charset="-122"/>
-                <a:cs typeface="Metropolis" pitchFamily="34" charset="-120"/>
-              </a:rPr>
-              <a:t>Repurchase requests are subject to acceptance by the Underlying Fund as well as the Underlying Fund's </a:t>
-            </a:r>
-            <a:pPr algn="l" marL="342900" indent="-342900">
-              <a:buSzPct val="100000"/>
-              <a:buChar char="•"/>
-            </a:pPr>
-            <a:r>
-              <a:rPr lang="en-US" sz="1000" dirty="0">
-                <a:solidFill>
-                  <a:srgbClr val="FFFFFF"/>
-                </a:solidFill>
-                <a:latin typeface="Metropolis" pitchFamily="34" charset="0"/>
-                <a:ea typeface="Metropolis" pitchFamily="34" charset="-122"/>
-                <a:cs typeface="Metropolis" pitchFamily="34" charset="-120"/>
-              </a:rPr>
               <a:t>.</a:t>
             </a:r>
-            <a:pPr algn="l" marL="342900" indent="-342900">
-              <a:spcAft>
-                <a:spcPts val="1000"/>
-              </a:spcAft>
-              <a:buSzPct val="100000"/>
-              <a:buChar char="•"/>
-            </a:pPr>
-            <a:r>
-              <a:rPr lang="en-US" sz="1000" dirty="0">
-                <a:solidFill>
-                  <a:srgbClr val="2F4251"/>
-                </a:solidFill>
-                <a:latin typeface="Metropolis" pitchFamily="34" charset="0"/>
-                <a:ea typeface="Metropolis" pitchFamily="34" charset="-122"/>
-                <a:cs typeface="Metropolis" pitchFamily="34" charset="-120"/>
-              </a:rPr>
-              <a:t>terms and conditions of such repurchase offers.</a:t>
-            </a:r>
-            <a:endParaRPr lang="en-US" sz="1000" dirty="0"/>
-          </a:p>
-          <a:p>
-            <a:pPr algn="l" indent="0" marL="0">
-              <a:buNone/>
-            </a:pPr>
-            <a:endParaRPr lang="en-US" sz="1000" dirty="0"/>
-          </a:p>
-          <a:p>
-            <a:pPr algn="l" indent="0" marL="0">
-              <a:buNone/>
-            </a:pPr>
-            <a:r>
-              <a:rPr lang="en-US" sz="1000" b="1" dirty="0">
-                <a:solidFill>
-                  <a:srgbClr val="2F4251"/>
-                </a:solidFill>
-                <a:latin typeface="Metropolis" pitchFamily="34" charset="0"/>
-                <a:ea typeface="Metropolis" pitchFamily="34" charset="-122"/>
-                <a:cs typeface="Metropolis" pitchFamily="34" charset="-120"/>
-              </a:rPr>
-              <a:t>REPURCHASE GATE</a:t>
-            </a:r>
-            <a:endParaRPr lang="en-US" sz="1000" dirty="0"/>
-          </a:p>
-          <a:p>
-            <a:pPr algn="l" marL="342900" indent="-342900">
-              <a:buSzPct val="100000"/>
-              <a:buChar char="•"/>
-            </a:pPr>
-            <a:r>
-              <a:rPr lang="en-US" sz="800" dirty="0">
-                <a:solidFill>
-                  <a:srgbClr val="0077AA"/>
-                </a:solidFill>
-                <a:latin typeface="Metropolis" pitchFamily="34" charset="0"/>
-                <a:ea typeface="Metropolis" pitchFamily="34" charset="-122"/>
-                <a:cs typeface="Metropolis" pitchFamily="34" charset="-120"/>
-              </a:rPr>
-              <a:t> </a:t>
-            </a:r>
-            <a:pPr algn="l" marL="342900" indent="-342900">
-              <a:buSzPct val="100000"/>
-              <a:buChar char="•"/>
-            </a:pPr>
-            <a:r>
-              <a:rPr lang="en-US" sz="1000" dirty="0">
-                <a:solidFill>
-                  <a:srgbClr val="2F4251"/>
-                </a:solidFill>
-                <a:latin typeface="Metropolis" pitchFamily="34" charset="0"/>
-                <a:ea typeface="Metropolis" pitchFamily="34" charset="-122"/>
-                <a:cs typeface="Metropolis" pitchFamily="34" charset="-120"/>
-              </a:rPr>
-              <a:t>Any shares held for less than one year are subject to a 2% early repurchase fee deduction.</a:t>
-            </a:r>
-            <a:pPr algn="l" marL="342900" indent="-342900">
-              <a:buSzPct val="100000"/>
-              <a:buChar char="•"/>
-            </a:pPr>
-            <a:r>
-              <a:rPr lang="en-US" sz="1000" dirty="0">
-                <a:solidFill>
-                  <a:srgbClr val="FFFFFF"/>
-                </a:solidFill>
-                <a:latin typeface="Metropolis" pitchFamily="34" charset="0"/>
-                <a:ea typeface="Metropolis" pitchFamily="34" charset="-122"/>
-                <a:cs typeface="Metropolis" pitchFamily="34" charset="-120"/>
-              </a:rPr>
-              <a:t>.</a:t>
-            </a:r>
-            <a:pPr algn="l" indent="0" marL="0">
-              <a:buNone/>
-            </a:pPr>
             <a:endParaRPr lang="en-US" sz="1000" dirty="0"/>
           </a:p>
         </p:txBody>
@@ -2516,7 +2237,7 @@
           <a:bodyPr wrap="square" rtlCol="0" anchor="ctr"/>
           <a:lstStyle/>
           <a:p>
-            <a:pPr algn="ctr" indent="0" marL="0">
+            <a:pPr marL="0" indent="0" algn="ctr">
               <a:buNone/>
             </a:pPr>
             <a:r>
@@ -2550,6 +2271,7 @@
         <a:solidFill>
           <a:srgbClr val="FFFFFF"/>
         </a:solidFill>
+        <a:effectLst/>
       </p:bgPr>
     </p:bg>
     <p:spTree>
@@ -2568,14 +2290,14 @@
       </p:grpSpPr>
       <p:pic>
         <p:nvPicPr>
-          <p:cNvPr id="2" name="Image 0" descr="preencoded.png">    </p:cNvPr>
+          <p:cNvPr id="2" name="Image 0" descr="preencoded.png"/>
           <p:cNvPicPr>
             <a:picLocks noChangeAspect="1"/>
           </p:cNvPicPr>
           <p:nvPr/>
         </p:nvPicPr>
         <p:blipFill>
-          <a:blip r:embed="rId1"/>
+          <a:blip r:embed="rId3"/>
           <a:stretch>
             <a:fillRect/>
           </a:stretch>
@@ -2611,7 +2333,7 @@
           <a:bodyPr wrap="square" rtlCol="0" anchor="ctr"/>
           <a:lstStyle/>
           <a:p>
-            <a:pPr algn="l" indent="0" marL="0">
+            <a:pPr marL="0" indent="0" algn="l">
               <a:buNone/>
             </a:pPr>
             <a:r>
@@ -2628,7 +2350,7 @@
             <a:endParaRPr lang="en-US" sz="1400" dirty="0"/>
           </a:p>
           <a:p>
-            <a:pPr algn="l" indent="0" marL="0">
+            <a:pPr marL="0" indent="0" algn="l">
               <a:buNone/>
             </a:pPr>
             <a:r>
@@ -2667,7 +2389,7 @@
           <a:bodyPr wrap="square" rtlCol="0" anchor="ctr"/>
           <a:lstStyle/>
           <a:p>
-            <a:pPr algn="l" indent="0" marL="0">
+            <a:pPr marL="0" indent="0" algn="l">
               <a:buNone/>
             </a:pPr>
             <a:r>
@@ -2706,7 +2428,7 @@
           <a:bodyPr wrap="square" rtlCol="0" anchor="ctr"/>
           <a:lstStyle/>
           <a:p>
-            <a:pPr algn="l" indent="0" marL="0">
+            <a:pPr marL="0" indent="0" algn="l">
               <a:buNone/>
             </a:pPr>
             <a:r>
@@ -2746,10 +2468,17 @@
             <a:prstDash val="solid"/>
           </a:ln>
         </p:spPr>
+        <p:txBody>
+          <a:bodyPr/>
+          <a:lstStyle/>
+          <a:p>
+            <a:endParaRPr lang="pt-BR"/>
+          </a:p>
+        </p:txBody>
       </p:sp>
       <p:graphicFrame>
         <p:nvGraphicFramePr>
-          <p:cNvPr id="3" name="Table 0"/>
+          <p:cNvPr id="7" name="Table 0"/>
           <p:cNvGraphicFramePr>
             <a:graphicFrameLocks noGrp="1"/>
           </p:cNvGraphicFramePr>
@@ -2770,17 +2499,35 @@
             <a:tbl>
               <a:tblPr/>
               <a:tblGrid>
-                <a:gridCol w="2011680"/>
-                <a:gridCol w="2926080"/>
-                <a:gridCol w="2011680"/>
+                <a:gridCol w="2011680">
+                  <a:extLst>
+                    <a:ext uri="{9D8B030D-6E8A-4147-A177-3AD203B41FA5}">
+                      <a16:colId xmlns:a16="http://schemas.microsoft.com/office/drawing/2014/main" val="20000"/>
+                    </a:ext>
+                  </a:extLst>
+                </a:gridCol>
+                <a:gridCol w="2926080">
+                  <a:extLst>
+                    <a:ext uri="{9D8B030D-6E8A-4147-A177-3AD203B41FA5}">
+                      <a16:colId xmlns:a16="http://schemas.microsoft.com/office/drawing/2014/main" val="20001"/>
+                    </a:ext>
+                  </a:extLst>
+                </a:gridCol>
+                <a:gridCol w="2011680">
+                  <a:extLst>
+                    <a:ext uri="{9D8B030D-6E8A-4147-A177-3AD203B41FA5}">
+                      <a16:colId xmlns:a16="http://schemas.microsoft.com/office/drawing/2014/main" val="20002"/>
+                    </a:ext>
+                  </a:extLst>
+                </a:gridCol>
               </a:tblGrid>
-              <a:tr h="91440">
+              <a:tr h="0">
                 <a:tc>
                   <a:txBody>
                     <a:bodyPr/>
                     <a:lstStyle/>
                     <a:p>
-                      <a:pPr algn="l" indent="0" marL="0">
+                      <a:pPr marL="0" indent="0" algn="l">
                         <a:buNone/>
                       </a:pPr>
                       <a:r>
@@ -2801,7 +2548,7 @@
                       </a:endParaRPr>
                     </a:p>
                   </a:txBody>
-                  <a:tcPr marL="91440" marR="91440" marT="45720" marB="45720">
+                  <a:tcPr>
                     <a:lnL w="0" cap="flat" cmpd="sng" algn="ctr">
                       <a:noFill/>
                     </a:lnL>
@@ -2821,7 +2568,7 @@
                     <a:bodyPr/>
                     <a:lstStyle/>
                     <a:p>
-                      <a:pPr algn="ctr" indent="0" marL="0">
+                      <a:pPr marL="0" indent="0" algn="ctr">
                         <a:buNone/>
                       </a:pPr>
                       <a:r>
@@ -2842,7 +2589,7 @@
                       </a:endParaRPr>
                     </a:p>
                   </a:txBody>
-                  <a:tcPr marL="91440" marR="91440" marT="45720" marB="45720">
+                  <a:tcPr>
                     <a:lnL w="0" cap="flat" cmpd="sng" algn="ctr">
                       <a:noFill/>
                     </a:lnL>
@@ -2862,7 +2609,7 @@
                     <a:bodyPr/>
                     <a:lstStyle/>
                     <a:p>
-                      <a:pPr algn="r" indent="0" marL="0">
+                      <a:pPr marL="0" indent="0" algn="r">
                         <a:buNone/>
                       </a:pPr>
                       <a:r>
@@ -2873,7 +2620,7 @@
                           <a:latin typeface="Metropolis" pitchFamily="34" charset="0"/>
                           <a:ea typeface="Metropolis" pitchFamily="34" charset="-122"/>
                           <a:cs typeface="Metropolis" pitchFamily="34" charset="-120"/>
-                          <a:hlinkClick r:id="rId2" invalidUrl="" action="" tgtFrame="" tooltip="" history="1" highlightClick="0" endSnd="0">
+                          <a:hlinkClick r:id="" action="ppaction://noaction">
                             <a:extLst>
                               <a:ext uri="{A12FA001-AC4F-418D-AE19-62706E023703}">
                                 <ahyp:hlinkClr xmlns:ahyp="http://schemas.microsoft.com/office/drawing/2018/hyperlinkcolor" val="tx"/>
@@ -2883,9 +2630,6 @@
                         </a:rPr>
                         <a:t>www.icapital.com</a:t>
                       </a:r>
-                      <a:pPr algn="r" indent="0" marL="0">
-                        <a:buNone/>
-                      </a:pPr>
                       <a:r>
                         <a:rPr lang="en-US" sz="800" dirty="0">
                           <a:solidFill>
@@ -2904,7 +2648,7 @@
                       </a:endParaRPr>
                     </a:p>
                   </a:txBody>
-                  <a:tcPr marL="91440" marR="91440" marT="45720" marB="45720">
+                  <a:tcPr>
                     <a:lnL w="0" cap="flat" cmpd="sng" algn="ctr">
                       <a:noFill/>
                     </a:lnL>
@@ -2919,6 +2663,11 @@
                     </a:lnB>
                   </a:tcPr>
                 </a:tc>
+                <a:extLst>
+                  <a:ext uri="{0D108BD9-81ED-4DB2-BD59-A6C34878D82A}">
+                    <a16:rowId xmlns:a16="http://schemas.microsoft.com/office/drawing/2014/main" val="10000"/>
+                  </a:ext>
+                </a:extLst>
               </a:tr>
             </a:tbl>
           </a:graphicData>
@@ -2945,7 +2694,7 @@
           <a:bodyPr wrap="square" rtlCol="0" anchor="ctr"/>
           <a:lstStyle/>
           <a:p>
-            <a:pPr algn="l" indent="0" marL="0">
+            <a:pPr marL="0" indent="0" algn="l">
               <a:buNone/>
             </a:pPr>
             <a:r>
@@ -2960,9 +2709,6 @@
               <a:t>UNDERLYING FUND
 </a:t>
             </a:r>
-            <a:pPr algn="l" indent="0" marL="0">
-              <a:buNone/>
-            </a:pPr>
             <a:r>
               <a:rPr lang="en-US" sz="1000" dirty="0">
                 <a:solidFill>
@@ -2975,9 +2721,6 @@
               <a:t>BlackRock Private Investments Fund
 </a:t>
             </a:r>
-            <a:pPr algn="l" indent="0" marL="0">
-              <a:buNone/>
-            </a:pPr>
             <a:r>
               <a:rPr lang="en-US" sz="1000" b="1" dirty="0">
                 <a:solidFill>
@@ -2990,9 +2733,6 @@
               <a:t>TERM
 </a:t>
             </a:r>
-            <a:pPr algn="l" indent="0" marL="0">
-              <a:buNone/>
-            </a:pPr>
             <a:r>
               <a:rPr lang="en-US" sz="1000" dirty="0">
                 <a:solidFill>
@@ -3005,9 +2745,6 @@
               <a:t>Perpetual
 </a:t>
             </a:r>
-            <a:pPr algn="l" indent="0" marL="0">
-              <a:buNone/>
-            </a:pPr>
             <a:r>
               <a:rPr lang="en-US" sz="1000" b="1" dirty="0">
                 <a:solidFill>
@@ -3022,7 +2759,7 @@
             <a:endParaRPr lang="en-US" sz="1000" dirty="0"/>
           </a:p>
           <a:p>
-            <a:pPr algn="l" marL="342900" indent="-342900">
+            <a:pPr marL="342900" indent="-342900" algn="l">
               <a:buSzPct val="100000"/>
               <a:buChar char="•"/>
             </a:pPr>
@@ -3037,10 +2774,6 @@
               </a:rPr>
               <a:t> </a:t>
             </a:r>
-            <a:pPr algn="l" marL="342900" indent="-342900">
-              <a:buSzPct val="100000"/>
-              <a:buChar char="•"/>
-            </a:pPr>
             <a:r>
               <a:rPr lang="en-US" sz="1000" dirty="0">
                 <a:solidFill>
@@ -3052,10 +2785,6 @@
               </a:rPr>
               <a:t>1.75% per annum; charged on net asset value.</a:t>
             </a:r>
-            <a:pPr algn="l" marL="342900" indent="-342900">
-              <a:buSzPct val="100000"/>
-              <a:buChar char="•"/>
-            </a:pPr>
             <a:r>
               <a:rPr lang="en-US" sz="1000" dirty="0">
                 <a:solidFill>
@@ -3067,13 +2796,10 @@
               </a:rPr>
               <a:t>.</a:t>
             </a:r>
-            <a:pPr algn="l" indent="0" marL="0">
-              <a:buNone/>
-            </a:pPr>
             <a:endParaRPr lang="en-US" sz="1000" dirty="0"/>
           </a:p>
           <a:p>
-            <a:pPr algn="l" indent="0" marL="0">
+            <a:pPr marL="0" indent="0" algn="l">
               <a:buNone/>
             </a:pPr>
             <a:r>
@@ -3115,7 +2841,7 @@
           <a:bodyPr wrap="square" rtlCol="0" anchor="ctr"/>
           <a:lstStyle/>
           <a:p>
-            <a:pPr algn="just" indent="0" marL="0">
+            <a:pPr marL="0" indent="0" algn="just">
               <a:spcAft>
                 <a:spcPts val="1000"/>
               </a:spcAft>
@@ -3135,7 +2861,7 @@
             <a:endParaRPr lang="en-US" sz="800" dirty="0"/>
           </a:p>
           <a:p>
-            <a:pPr algn="just" indent="0" marL="0">
+            <a:pPr marL="0" indent="0" algn="just">
               <a:spcAft>
                 <a:spcPts val="1000"/>
               </a:spcAft>
@@ -3155,7 +2881,7 @@
             <a:endParaRPr lang="en-US" sz="800" dirty="0"/>
           </a:p>
           <a:p>
-            <a:pPr algn="ctr" indent="0" marL="0">
+            <a:pPr marL="0" indent="0" algn="ctr">
               <a:buNone/>
             </a:pPr>
             <a:r>
@@ -3189,6 +2915,7 @@
         <a:solidFill>
           <a:srgbClr val="FFFFFF"/>
         </a:solidFill>
+        <a:effectLst/>
       </p:bgPr>
     </p:bg>
     <p:spTree>
@@ -3207,14 +2934,14 @@
       </p:grpSpPr>
       <p:pic>
         <p:nvPicPr>
-          <p:cNvPr id="2" name="Image 0" descr="preencoded.png">    </p:cNvPr>
+          <p:cNvPr id="2" name="Image 0" descr="preencoded.png"/>
           <p:cNvPicPr>
             <a:picLocks noChangeAspect="1"/>
           </p:cNvPicPr>
           <p:nvPr/>
         </p:nvPicPr>
         <p:blipFill>
-          <a:blip r:embed="rId1"/>
+          <a:blip r:embed="rId3"/>
           <a:stretch>
             <a:fillRect/>
           </a:stretch>
@@ -3250,7 +2977,7 @@
           <a:bodyPr wrap="square" rtlCol="0" anchor="ctr"/>
           <a:lstStyle/>
           <a:p>
-            <a:pPr algn="l" indent="0" marL="0">
+            <a:pPr marL="0" indent="0" algn="l">
               <a:buNone/>
             </a:pPr>
             <a:r>
@@ -3267,7 +2994,7 @@
             <a:endParaRPr lang="en-US" sz="1400" dirty="0"/>
           </a:p>
           <a:p>
-            <a:pPr algn="l" indent="0" marL="0">
+            <a:pPr marL="0" indent="0" algn="l">
               <a:buNone/>
             </a:pPr>
             <a:r>
@@ -3306,7 +3033,7 @@
           <a:bodyPr wrap="square" rtlCol="0" anchor="ctr"/>
           <a:lstStyle/>
           <a:p>
-            <a:pPr algn="l" indent="0" marL="0">
+            <a:pPr marL="0" indent="0" algn="l">
               <a:buNone/>
             </a:pPr>
             <a:r>
@@ -3345,7 +3072,7 @@
           <a:bodyPr wrap="square" rtlCol="0" anchor="ctr"/>
           <a:lstStyle/>
           <a:p>
-            <a:pPr algn="l" indent="0" marL="0">
+            <a:pPr marL="0" indent="0" algn="l">
               <a:buNone/>
             </a:pPr>
             <a:endParaRPr lang="en-US" sz="1600" dirty="0"/>
@@ -3374,10 +3101,17 @@
             <a:prstDash val="solid"/>
           </a:ln>
         </p:spPr>
+        <p:txBody>
+          <a:bodyPr/>
+          <a:lstStyle/>
+          <a:p>
+            <a:endParaRPr lang="pt-BR"/>
+          </a:p>
+        </p:txBody>
       </p:sp>
       <p:graphicFrame>
         <p:nvGraphicFramePr>
-          <p:cNvPr id="4" name="Table 0"/>
+          <p:cNvPr id="10" name="Table 0"/>
           <p:cNvGraphicFramePr>
             <a:graphicFrameLocks noGrp="1"/>
           </p:cNvGraphicFramePr>
@@ -3398,17 +3132,35 @@
             <a:tbl>
               <a:tblPr/>
               <a:tblGrid>
-                <a:gridCol w="2011680"/>
-                <a:gridCol w="2926080"/>
-                <a:gridCol w="2011680"/>
+                <a:gridCol w="2011680">
+                  <a:extLst>
+                    <a:ext uri="{9D8B030D-6E8A-4147-A177-3AD203B41FA5}">
+                      <a16:colId xmlns:a16="http://schemas.microsoft.com/office/drawing/2014/main" val="20000"/>
+                    </a:ext>
+                  </a:extLst>
+                </a:gridCol>
+                <a:gridCol w="2926080">
+                  <a:extLst>
+                    <a:ext uri="{9D8B030D-6E8A-4147-A177-3AD203B41FA5}">
+                      <a16:colId xmlns:a16="http://schemas.microsoft.com/office/drawing/2014/main" val="20001"/>
+                    </a:ext>
+                  </a:extLst>
+                </a:gridCol>
+                <a:gridCol w="2011680">
+                  <a:extLst>
+                    <a:ext uri="{9D8B030D-6E8A-4147-A177-3AD203B41FA5}">
+                      <a16:colId xmlns:a16="http://schemas.microsoft.com/office/drawing/2014/main" val="20002"/>
+                    </a:ext>
+                  </a:extLst>
+                </a:gridCol>
               </a:tblGrid>
-              <a:tr h="91440">
+              <a:tr h="0">
                 <a:tc>
                   <a:txBody>
                     <a:bodyPr/>
                     <a:lstStyle/>
                     <a:p>
-                      <a:pPr algn="l" indent="0" marL="0">
+                      <a:pPr marL="0" indent="0" algn="l">
                         <a:buNone/>
                       </a:pPr>
                       <a:r>
@@ -3429,7 +3181,7 @@
                       </a:endParaRPr>
                     </a:p>
                   </a:txBody>
-                  <a:tcPr marL="91440" marR="91440" marT="45720" marB="45720">
+                  <a:tcPr>
                     <a:lnL w="0" cap="flat" cmpd="sng" algn="ctr">
                       <a:noFill/>
                     </a:lnL>
@@ -3449,7 +3201,7 @@
                     <a:bodyPr/>
                     <a:lstStyle/>
                     <a:p>
-                      <a:pPr algn="ctr" indent="0" marL="0">
+                      <a:pPr marL="0" indent="0" algn="ctr">
                         <a:buNone/>
                       </a:pPr>
                       <a:r>
@@ -3470,7 +3222,7 @@
                       </a:endParaRPr>
                     </a:p>
                   </a:txBody>
-                  <a:tcPr marL="91440" marR="91440" marT="45720" marB="45720">
+                  <a:tcPr>
                     <a:lnL w="0" cap="flat" cmpd="sng" algn="ctr">
                       <a:noFill/>
                     </a:lnL>
@@ -3490,7 +3242,7 @@
                     <a:bodyPr/>
                     <a:lstStyle/>
                     <a:p>
-                      <a:pPr algn="r" indent="0" marL="0">
+                      <a:pPr marL="0" indent="0" algn="r">
                         <a:buNone/>
                       </a:pPr>
                       <a:r>
@@ -3501,7 +3253,7 @@
                           <a:latin typeface="Metropolis" pitchFamily="34" charset="0"/>
                           <a:ea typeface="Metropolis" pitchFamily="34" charset="-122"/>
                           <a:cs typeface="Metropolis" pitchFamily="34" charset="-120"/>
-                          <a:hlinkClick r:id="rId2" invalidUrl="" action="" tgtFrame="" tooltip="" history="1" highlightClick="0" endSnd="0">
+                          <a:hlinkClick r:id="" action="ppaction://noaction">
                             <a:extLst>
                               <a:ext uri="{A12FA001-AC4F-418D-AE19-62706E023703}">
                                 <ahyp:hlinkClr xmlns:ahyp="http://schemas.microsoft.com/office/drawing/2018/hyperlinkcolor" val="tx"/>
@@ -3511,9 +3263,6 @@
                         </a:rPr>
                         <a:t>www.icapital.com</a:t>
                       </a:r>
-                      <a:pPr algn="r" indent="0" marL="0">
-                        <a:buNone/>
-                      </a:pPr>
                       <a:r>
                         <a:rPr lang="en-US" sz="800" dirty="0">
                           <a:solidFill>
@@ -3532,7 +3281,7 @@
                       </a:endParaRPr>
                     </a:p>
                   </a:txBody>
-                  <a:tcPr marL="91440" marR="91440" marT="45720" marB="45720">
+                  <a:tcPr>
                     <a:lnL w="0" cap="flat" cmpd="sng" algn="ctr">
                       <a:noFill/>
                     </a:lnL>
@@ -3547,6 +3296,11 @@
                     </a:lnB>
                   </a:tcPr>
                 </a:tc>
+                <a:extLst>
+                  <a:ext uri="{0D108BD9-81ED-4DB2-BD59-A6C34878D82A}">
+                    <a16:rowId xmlns:a16="http://schemas.microsoft.com/office/drawing/2014/main" val="10000"/>
+                  </a:ext>
+                </a:extLst>
               </a:tr>
             </a:tbl>
           </a:graphicData>
@@ -3573,7 +3327,7 @@
           <a:bodyPr wrap="square" rtlCol="0" anchor="ctr"/>
           <a:lstStyle/>
           <a:p>
-            <a:pPr algn="l" indent="0" marL="0">
+            <a:pPr marL="0" indent="0" algn="l">
               <a:buNone/>
             </a:pPr>
             <a:r>
@@ -3588,9 +3342,6 @@
               <a:t>END NOTES
 </a:t>
             </a:r>
-            <a:pPr algn="l" indent="0" marL="0">
-              <a:buNone/>
-            </a:pPr>
             <a:r>
               <a:rPr lang="en-US" sz="800" dirty="0">
                 <a:solidFill>
@@ -3627,7 +3378,7 @@
           <a:bodyPr wrap="square" rtlCol="0" anchor="ctr"/>
           <a:lstStyle/>
           <a:p>
-            <a:pPr algn="l" indent="0" marL="0">
+            <a:pPr marL="0" indent="0" algn="l">
               <a:buNone/>
             </a:pPr>
             <a:r>
@@ -3668,9 +3419,27 @@
             <a:tbl>
               <a:tblPr/>
               <a:tblGrid>
-                <a:gridCol w="2316480"/>
-                <a:gridCol w="2316480"/>
-                <a:gridCol w="2316480"/>
+                <a:gridCol w="2316480">
+                  <a:extLst>
+                    <a:ext uri="{9D8B030D-6E8A-4147-A177-3AD203B41FA5}">
+                      <a16:colId xmlns:a16="http://schemas.microsoft.com/office/drawing/2014/main" val="20000"/>
+                    </a:ext>
+                  </a:extLst>
+                </a:gridCol>
+                <a:gridCol w="2316480">
+                  <a:extLst>
+                    <a:ext uri="{9D8B030D-6E8A-4147-A177-3AD203B41FA5}">
+                      <a16:colId xmlns:a16="http://schemas.microsoft.com/office/drawing/2014/main" val="20001"/>
+                    </a:ext>
+                  </a:extLst>
+                </a:gridCol>
+                <a:gridCol w="2316480">
+                  <a:extLst>
+                    <a:ext uri="{9D8B030D-6E8A-4147-A177-3AD203B41FA5}">
+                      <a16:colId xmlns:a16="http://schemas.microsoft.com/office/drawing/2014/main" val="20002"/>
+                    </a:ext>
+                  </a:extLst>
+                </a:gridCol>
               </a:tblGrid>
               <a:tr h="6949440">
                 <a:tc>
@@ -3678,7 +3447,7 @@
                     <a:bodyPr/>
                     <a:lstStyle/>
                     <a:p>
-                      <a:pPr algn="l" indent="0" marL="0">
+                      <a:pPr marL="0" indent="0" algn="l">
                         <a:buNone/>
                       </a:pPr>
                       <a:r>
@@ -3700,7 +3469,7 @@
                       </a:endParaRPr>
                     </a:p>
                     <a:p>
-                      <a:pPr algn="l" indent="0" marL="0">
+                      <a:pPr marL="0" indent="0" algn="l">
                         <a:buNone/>
                       </a:pPr>
                       <a:r>
@@ -3722,7 +3491,7 @@
                       </a:endParaRPr>
                     </a:p>
                     <a:p>
-                      <a:pPr algn="l" indent="0" marL="0">
+                      <a:pPr marL="0" indent="0" algn="l">
                         <a:buNone/>
                       </a:pPr>
                       <a:r>
@@ -3744,7 +3513,7 @@
                       </a:endParaRPr>
                     </a:p>
                   </a:txBody>
-                  <a:tcPr marL="91440" marR="91440" marT="45720" marB="45720">
+                  <a:tcPr>
                     <a:lnL w="0" cap="flat" cmpd="sng" algn="ctr">
                       <a:noFill/>
                     </a:lnL>
@@ -3764,7 +3533,7 @@
                     <a:bodyPr/>
                     <a:lstStyle/>
                     <a:p>
-                      <a:pPr algn="l" indent="0" marL="0">
+                      <a:pPr marL="0" indent="0" algn="l">
                         <a:buNone/>
                       </a:pPr>
                       <a:r>
@@ -3786,7 +3555,7 @@
                       </a:endParaRPr>
                     </a:p>
                     <a:p>
-                      <a:pPr algn="l" indent="0" marL="0">
+                      <a:pPr marL="0" indent="0" algn="l">
                         <a:buNone/>
                       </a:pPr>
                       <a:r>
@@ -3807,7 +3576,7 @@
                       </a:endParaRPr>
                     </a:p>
                   </a:txBody>
-                  <a:tcPr marL="91440" marR="91440" marT="45720" marB="45720">
+                  <a:tcPr>
                     <a:lnL w="0" cap="flat" cmpd="sng" algn="ctr">
                       <a:noFill/>
                     </a:lnL>
@@ -3827,7 +3596,7 @@
                     <a:bodyPr/>
                     <a:lstStyle/>
                     <a:p>
-                      <a:pPr algn="l" indent="0" marL="0">
+                      <a:pPr marL="0" indent="0" algn="l">
                         <a:buNone/>
                       </a:pPr>
                       <a:r>
@@ -3848,7 +3617,7 @@
                       </a:endParaRPr>
                     </a:p>
                     <a:p>
-                      <a:pPr algn="l" indent="0" marL="0">
+                      <a:pPr marL="0" indent="0" algn="l">
                         <a:buNone/>
                       </a:pPr>
                       <a:r>
@@ -3871,7 +3640,7 @@
                       </a:endParaRPr>
                     </a:p>
                   </a:txBody>
-                  <a:tcPr marL="91440" marR="91440" marT="45720" marB="45720">
+                  <a:tcPr>
                     <a:lnL w="0" cap="flat" cmpd="sng" algn="ctr">
                       <a:noFill/>
                     </a:lnL>
@@ -3886,6 +3655,11 @@
                     </a:lnB>
                   </a:tcPr>
                 </a:tc>
+                <a:extLst>
+                  <a:ext uri="{0D108BD9-81ED-4DB2-BD59-A6C34878D82A}">
+                    <a16:rowId xmlns:a16="http://schemas.microsoft.com/office/drawing/2014/main" val="10000"/>
+                  </a:ext>
+                </a:extLst>
               </a:tr>
             </a:tbl>
           </a:graphicData>
@@ -3907,6 +3681,7 @@
         <a:solidFill>
           <a:srgbClr val="FFFFFF"/>
         </a:solidFill>
+        <a:effectLst/>
       </p:bgPr>
     </p:bg>
     <p:spTree>
@@ -3925,14 +3700,14 @@
       </p:grpSpPr>
       <p:pic>
         <p:nvPicPr>
-          <p:cNvPr id="2" name="Image 0" descr="preencoded.png">    </p:cNvPr>
+          <p:cNvPr id="2" name="Image 0" descr="preencoded.png"/>
           <p:cNvPicPr>
             <a:picLocks noChangeAspect="1"/>
           </p:cNvPicPr>
           <p:nvPr/>
         </p:nvPicPr>
         <p:blipFill>
-          <a:blip r:embed="rId1"/>
+          <a:blip r:embed="rId3"/>
           <a:stretch>
             <a:fillRect/>
           </a:stretch>
@@ -3968,7 +3743,7 @@
           <a:bodyPr wrap="square" rtlCol="0" anchor="ctr"/>
           <a:lstStyle/>
           <a:p>
-            <a:pPr algn="l" indent="0" marL="0">
+            <a:pPr marL="0" indent="0" algn="l">
               <a:buNone/>
             </a:pPr>
             <a:r>
@@ -3985,7 +3760,7 @@
             <a:endParaRPr lang="en-US" sz="1400" dirty="0"/>
           </a:p>
           <a:p>
-            <a:pPr algn="l" indent="0" marL="0">
+            <a:pPr marL="0" indent="0" algn="l">
               <a:buNone/>
             </a:pPr>
             <a:r>
@@ -4024,7 +3799,7 @@
           <a:bodyPr wrap="square" rtlCol="0" anchor="ctr"/>
           <a:lstStyle/>
           <a:p>
-            <a:pPr algn="l" indent="0" marL="0">
+            <a:pPr marL="0" indent="0" algn="l">
               <a:buNone/>
             </a:pPr>
             <a:r>
@@ -4063,7 +3838,7 @@
           <a:bodyPr wrap="square" rtlCol="0" anchor="ctr"/>
           <a:lstStyle/>
           <a:p>
-            <a:pPr algn="l" indent="0" marL="0">
+            <a:pPr marL="0" indent="0" algn="l">
               <a:buNone/>
             </a:pPr>
             <a:endParaRPr lang="en-US" sz="1600" dirty="0"/>
@@ -4092,10 +3867,17 @@
             <a:prstDash val="solid"/>
           </a:ln>
         </p:spPr>
+        <p:txBody>
+          <a:bodyPr/>
+          <a:lstStyle/>
+          <a:p>
+            <a:endParaRPr lang="pt-BR"/>
+          </a:p>
+        </p:txBody>
       </p:sp>
       <p:graphicFrame>
         <p:nvGraphicFramePr>
-          <p:cNvPr id="5" name="Table 0"/>
+          <p:cNvPr id="7" name="Table 0"/>
           <p:cNvGraphicFramePr>
             <a:graphicFrameLocks noGrp="1"/>
           </p:cNvGraphicFramePr>
@@ -4116,17 +3898,35 @@
             <a:tbl>
               <a:tblPr/>
               <a:tblGrid>
-                <a:gridCol w="2011680"/>
-                <a:gridCol w="2926080"/>
-                <a:gridCol w="2011680"/>
+                <a:gridCol w="2011680">
+                  <a:extLst>
+                    <a:ext uri="{9D8B030D-6E8A-4147-A177-3AD203B41FA5}">
+                      <a16:colId xmlns:a16="http://schemas.microsoft.com/office/drawing/2014/main" val="20000"/>
+                    </a:ext>
+                  </a:extLst>
+                </a:gridCol>
+                <a:gridCol w="2926080">
+                  <a:extLst>
+                    <a:ext uri="{9D8B030D-6E8A-4147-A177-3AD203B41FA5}">
+                      <a16:colId xmlns:a16="http://schemas.microsoft.com/office/drawing/2014/main" val="20001"/>
+                    </a:ext>
+                  </a:extLst>
+                </a:gridCol>
+                <a:gridCol w="2011680">
+                  <a:extLst>
+                    <a:ext uri="{9D8B030D-6E8A-4147-A177-3AD203B41FA5}">
+                      <a16:colId xmlns:a16="http://schemas.microsoft.com/office/drawing/2014/main" val="20002"/>
+                    </a:ext>
+                  </a:extLst>
+                </a:gridCol>
               </a:tblGrid>
-              <a:tr h="91440">
+              <a:tr h="0">
                 <a:tc>
                   <a:txBody>
                     <a:bodyPr/>
                     <a:lstStyle/>
                     <a:p>
-                      <a:pPr algn="l" indent="0" marL="0">
+                      <a:pPr marL="0" indent="0" algn="l">
                         <a:buNone/>
                       </a:pPr>
                       <a:r>
@@ -4147,7 +3947,7 @@
                       </a:endParaRPr>
                     </a:p>
                   </a:txBody>
-                  <a:tcPr marL="91440" marR="91440" marT="45720" marB="45720">
+                  <a:tcPr>
                     <a:lnL w="0" cap="flat" cmpd="sng" algn="ctr">
                       <a:noFill/>
                     </a:lnL>
@@ -4167,7 +3967,7 @@
                     <a:bodyPr/>
                     <a:lstStyle/>
                     <a:p>
-                      <a:pPr algn="ctr" indent="0" marL="0">
+                      <a:pPr marL="0" indent="0" algn="ctr">
                         <a:buNone/>
                       </a:pPr>
                       <a:r>
@@ -4188,7 +3988,7 @@
                       </a:endParaRPr>
                     </a:p>
                   </a:txBody>
-                  <a:tcPr marL="91440" marR="91440" marT="45720" marB="45720">
+                  <a:tcPr>
                     <a:lnL w="0" cap="flat" cmpd="sng" algn="ctr">
                       <a:noFill/>
                     </a:lnL>
@@ -4208,7 +4008,7 @@
                     <a:bodyPr/>
                     <a:lstStyle/>
                     <a:p>
-                      <a:pPr algn="r" indent="0" marL="0">
+                      <a:pPr marL="0" indent="0" algn="r">
                         <a:buNone/>
                       </a:pPr>
                       <a:r>
@@ -4219,7 +4019,7 @@
                           <a:latin typeface="Metropolis" pitchFamily="34" charset="0"/>
                           <a:ea typeface="Metropolis" pitchFamily="34" charset="-122"/>
                           <a:cs typeface="Metropolis" pitchFamily="34" charset="-120"/>
-                          <a:hlinkClick r:id="rId2" invalidUrl="" action="" tgtFrame="" tooltip="" history="1" highlightClick="0" endSnd="0">
+                          <a:hlinkClick r:id="" action="ppaction://noaction">
                             <a:extLst>
                               <a:ext uri="{A12FA001-AC4F-418D-AE19-62706E023703}">
                                 <ahyp:hlinkClr xmlns:ahyp="http://schemas.microsoft.com/office/drawing/2018/hyperlinkcolor" val="tx"/>
@@ -4229,9 +4029,6 @@
                         </a:rPr>
                         <a:t>www.icapital.com</a:t>
                       </a:r>
-                      <a:pPr algn="r" indent="0" marL="0">
-                        <a:buNone/>
-                      </a:pPr>
                       <a:r>
                         <a:rPr lang="en-US" sz="800" dirty="0">
                           <a:solidFill>
@@ -4250,7 +4047,7 @@
                       </a:endParaRPr>
                     </a:p>
                   </a:txBody>
-                  <a:tcPr marL="91440" marR="91440" marT="45720" marB="45720">
+                  <a:tcPr>
                     <a:lnL w="0" cap="flat" cmpd="sng" algn="ctr">
                       <a:noFill/>
                     </a:lnL>
@@ -4265,6 +4062,11 @@
                     </a:lnB>
                   </a:tcPr>
                 </a:tc>
+                <a:extLst>
+                  <a:ext uri="{0D108BD9-81ED-4DB2-BD59-A6C34878D82A}">
+                    <a16:rowId xmlns:a16="http://schemas.microsoft.com/office/drawing/2014/main" val="10000"/>
+                  </a:ext>
+                </a:extLst>
               </a:tr>
             </a:tbl>
           </a:graphicData>
@@ -4291,7 +4093,7 @@
           <a:bodyPr wrap="square" rtlCol="0" anchor="ctr"/>
           <a:lstStyle/>
           <a:p>
-            <a:pPr algn="l" indent="0" marL="0">
+            <a:pPr marL="0" indent="0" algn="l">
               <a:buNone/>
             </a:pPr>
             <a:r>
@@ -4332,9 +4134,27 @@
             <a:tbl>
               <a:tblPr/>
               <a:tblGrid>
-                <a:gridCol w="2316480"/>
-                <a:gridCol w="2316480"/>
-                <a:gridCol w="2316480"/>
+                <a:gridCol w="2316480">
+                  <a:extLst>
+                    <a:ext uri="{9D8B030D-6E8A-4147-A177-3AD203B41FA5}">
+                      <a16:colId xmlns:a16="http://schemas.microsoft.com/office/drawing/2014/main" val="20000"/>
+                    </a:ext>
+                  </a:extLst>
+                </a:gridCol>
+                <a:gridCol w="2316480">
+                  <a:extLst>
+                    <a:ext uri="{9D8B030D-6E8A-4147-A177-3AD203B41FA5}">
+                      <a16:colId xmlns:a16="http://schemas.microsoft.com/office/drawing/2014/main" val="20001"/>
+                    </a:ext>
+                  </a:extLst>
+                </a:gridCol>
+                <a:gridCol w="2316480">
+                  <a:extLst>
+                    <a:ext uri="{9D8B030D-6E8A-4147-A177-3AD203B41FA5}">
+                      <a16:colId xmlns:a16="http://schemas.microsoft.com/office/drawing/2014/main" val="20002"/>
+                    </a:ext>
+                  </a:extLst>
+                </a:gridCol>
               </a:tblGrid>
               <a:tr h="6949440">
                 <a:tc>
@@ -4342,7 +4162,7 @@
                     <a:bodyPr/>
                     <a:lstStyle/>
                     <a:p>
-                      <a:pPr algn="l" indent="0" marL="0">
+                      <a:pPr marL="0" indent="0" algn="l">
                         <a:buNone/>
                       </a:pPr>
                       <a:r>
@@ -4356,9 +4176,6 @@
                         </a:rPr>
                         <a:t>Investors in the Access Fund will be subject to the fees and expenses of the Access Fund which are in addition to the Underlying Fund’s fees and expenses. Investors in the Access Fund will experience lower returns than investors committing directly to the Underlying Fund as a result of the additional fees and expenses associated with an investment in the Access Fund. Unless otherwise indicated therein, any performance shown in the Underlying Fund Marketing Presentation is not that of the Access Fund, and performance shown for the Underlying Fund is not net of additional fees and expenses that will be charged the Access Fund Level (or any placement fee, if charged). </a:t>
                       </a:r>
-                      <a:pPr algn="l" indent="0" marL="0">
-                        <a:buNone/>
-                      </a:pPr>
                       <a:r>
                         <a:rPr lang="en-US" sz="800" dirty="0">
                           <a:solidFill>
@@ -4378,7 +4195,7 @@
                       </a:endParaRPr>
                     </a:p>
                     <a:p>
-                      <a:pPr algn="l" indent="0" marL="0">
+                      <a:pPr marL="0" indent="0" algn="l">
                         <a:buNone/>
                       </a:pPr>
                       <a:r>
@@ -4400,7 +4217,7 @@
                       </a:endParaRPr>
                     </a:p>
                     <a:p>
-                      <a:pPr algn="l" indent="0" marL="0">
+                      <a:pPr marL="0" indent="0" algn="l">
                         <a:buNone/>
                       </a:pPr>
                       <a:r>
@@ -4422,7 +4239,7 @@
                       </a:endParaRPr>
                     </a:p>
                   </a:txBody>
-                  <a:tcPr marL="91440" marR="91440" marT="45720" marB="45720">
+                  <a:tcPr>
                     <a:lnL w="0" cap="flat" cmpd="sng" algn="ctr">
                       <a:noFill/>
                     </a:lnL>
@@ -4442,7 +4259,7 @@
                     <a:bodyPr/>
                     <a:lstStyle/>
                     <a:p>
-                      <a:pPr algn="l" indent="0" marL="0">
+                      <a:pPr marL="0" indent="0" algn="l">
                         <a:buNone/>
                       </a:pPr>
                       <a:r>
@@ -4464,7 +4281,7 @@
                       </a:endParaRPr>
                     </a:p>
                     <a:p>
-                      <a:pPr algn="l" indent="0" marL="0">
+                      <a:pPr marL="0" indent="0" algn="l">
                         <a:buNone/>
                       </a:pPr>
                       <a:r>
@@ -4486,7 +4303,7 @@
                       </a:endParaRPr>
                     </a:p>
                   </a:txBody>
-                  <a:tcPr marL="91440" marR="91440" marT="45720" marB="45720">
+                  <a:tcPr>
                     <a:lnL w="0" cap="flat" cmpd="sng" algn="ctr">
                       <a:noFill/>
                     </a:lnL>
@@ -4506,7 +4323,7 @@
                     <a:bodyPr/>
                     <a:lstStyle/>
                     <a:p>
-                      <a:pPr algn="l" indent="0" marL="0">
+                      <a:pPr marL="0" indent="0" algn="l">
                         <a:buNone/>
                       </a:pPr>
                       <a:r>
@@ -4527,7 +4344,7 @@
                       </a:endParaRPr>
                     </a:p>
                   </a:txBody>
-                  <a:tcPr marL="91440" marR="91440" marT="45720" marB="45720">
+                  <a:tcPr>
                     <a:lnL w="0" cap="flat" cmpd="sng" algn="ctr">
                       <a:noFill/>
                     </a:lnL>
@@ -4542,6 +4359,11 @@
                     </a:lnB>
                   </a:tcPr>
                 </a:tc>
+                <a:extLst>
+                  <a:ext uri="{0D108BD9-81ED-4DB2-BD59-A6C34878D82A}">
+                    <a16:rowId xmlns:a16="http://schemas.microsoft.com/office/drawing/2014/main" val="10000"/>
+                  </a:ext>
+                </a:extLst>
               </a:tr>
             </a:tbl>
           </a:graphicData>
@@ -4563,6 +4385,7 @@
         <a:solidFill>
           <a:srgbClr val="FFFFFF"/>
         </a:solidFill>
+        <a:effectLst/>
       </p:bgPr>
     </p:bg>
     <p:spTree>
@@ -4581,14 +4404,14 @@
       </p:grpSpPr>
       <p:pic>
         <p:nvPicPr>
-          <p:cNvPr id="2" name="Image 0" descr="preencoded.png">    </p:cNvPr>
+          <p:cNvPr id="2" name="Image 0" descr="preencoded.png"/>
           <p:cNvPicPr>
             <a:picLocks noChangeAspect="1"/>
           </p:cNvPicPr>
           <p:nvPr/>
         </p:nvPicPr>
         <p:blipFill>
-          <a:blip r:embed="rId1"/>
+          <a:blip r:embed="rId3"/>
           <a:stretch>
             <a:fillRect/>
           </a:stretch>
@@ -4624,7 +4447,7 @@
           <a:bodyPr wrap="square" rtlCol="0" anchor="ctr"/>
           <a:lstStyle/>
           <a:p>
-            <a:pPr algn="l" indent="0" marL="0">
+            <a:pPr marL="0" indent="0" algn="l">
               <a:buNone/>
             </a:pPr>
             <a:r>
@@ -4641,7 +4464,7 @@
             <a:endParaRPr lang="en-US" sz="1400" dirty="0"/>
           </a:p>
           <a:p>
-            <a:pPr algn="l" indent="0" marL="0">
+            <a:pPr marL="0" indent="0" algn="l">
               <a:buNone/>
             </a:pPr>
             <a:r>
@@ -4680,7 +4503,7 @@
           <a:bodyPr wrap="square" rtlCol="0" anchor="ctr"/>
           <a:lstStyle/>
           <a:p>
-            <a:pPr algn="l" indent="0" marL="0">
+            <a:pPr marL="0" indent="0" algn="l">
               <a:buNone/>
             </a:pPr>
             <a:r>
@@ -4719,7 +4542,7 @@
           <a:bodyPr wrap="square" rtlCol="0" anchor="ctr"/>
           <a:lstStyle/>
           <a:p>
-            <a:pPr algn="l" indent="0" marL="0">
+            <a:pPr marL="0" indent="0" algn="l">
               <a:buNone/>
             </a:pPr>
             <a:endParaRPr lang="en-US" sz="1600" dirty="0"/>
@@ -4748,10 +4571,17 @@
             <a:prstDash val="solid"/>
           </a:ln>
         </p:spPr>
+        <p:txBody>
+          <a:bodyPr/>
+          <a:lstStyle/>
+          <a:p>
+            <a:endParaRPr lang="pt-BR"/>
+          </a:p>
+        </p:txBody>
       </p:sp>
       <p:graphicFrame>
         <p:nvGraphicFramePr>
-          <p:cNvPr id="6" name="Table 0"/>
+          <p:cNvPr id="7" name="Table 0"/>
           <p:cNvGraphicFramePr>
             <a:graphicFrameLocks noGrp="1"/>
           </p:cNvGraphicFramePr>
@@ -4772,17 +4602,35 @@
             <a:tbl>
               <a:tblPr/>
               <a:tblGrid>
-                <a:gridCol w="2011680"/>
-                <a:gridCol w="2926080"/>
-                <a:gridCol w="2011680"/>
+                <a:gridCol w="2011680">
+                  <a:extLst>
+                    <a:ext uri="{9D8B030D-6E8A-4147-A177-3AD203B41FA5}">
+                      <a16:colId xmlns:a16="http://schemas.microsoft.com/office/drawing/2014/main" val="20000"/>
+                    </a:ext>
+                  </a:extLst>
+                </a:gridCol>
+                <a:gridCol w="2926080">
+                  <a:extLst>
+                    <a:ext uri="{9D8B030D-6E8A-4147-A177-3AD203B41FA5}">
+                      <a16:colId xmlns:a16="http://schemas.microsoft.com/office/drawing/2014/main" val="20001"/>
+                    </a:ext>
+                  </a:extLst>
+                </a:gridCol>
+                <a:gridCol w="2011680">
+                  <a:extLst>
+                    <a:ext uri="{9D8B030D-6E8A-4147-A177-3AD203B41FA5}">
+                      <a16:colId xmlns:a16="http://schemas.microsoft.com/office/drawing/2014/main" val="20002"/>
+                    </a:ext>
+                  </a:extLst>
+                </a:gridCol>
               </a:tblGrid>
-              <a:tr h="91440">
+              <a:tr h="0">
                 <a:tc>
                   <a:txBody>
                     <a:bodyPr/>
                     <a:lstStyle/>
                     <a:p>
-                      <a:pPr algn="l" indent="0" marL="0">
+                      <a:pPr marL="0" indent="0" algn="l">
                         <a:buNone/>
                       </a:pPr>
                       <a:r>
@@ -4803,7 +4651,7 @@
                       </a:endParaRPr>
                     </a:p>
                   </a:txBody>
-                  <a:tcPr marL="91440" marR="91440" marT="45720" marB="45720">
+                  <a:tcPr>
                     <a:lnL w="0" cap="flat" cmpd="sng" algn="ctr">
                       <a:noFill/>
                     </a:lnL>
@@ -4823,7 +4671,7 @@
                     <a:bodyPr/>
                     <a:lstStyle/>
                     <a:p>
-                      <a:pPr algn="ctr" indent="0" marL="0">
+                      <a:pPr marL="0" indent="0" algn="ctr">
                         <a:buNone/>
                       </a:pPr>
                       <a:r>
@@ -4844,7 +4692,7 @@
                       </a:endParaRPr>
                     </a:p>
                   </a:txBody>
-                  <a:tcPr marL="91440" marR="91440" marT="45720" marB="45720">
+                  <a:tcPr>
                     <a:lnL w="0" cap="flat" cmpd="sng" algn="ctr">
                       <a:noFill/>
                     </a:lnL>
@@ -4864,7 +4712,7 @@
                     <a:bodyPr/>
                     <a:lstStyle/>
                     <a:p>
-                      <a:pPr algn="r" indent="0" marL="0">
+                      <a:pPr marL="0" indent="0" algn="r">
                         <a:buNone/>
                       </a:pPr>
                       <a:r>
@@ -4875,7 +4723,7 @@
                           <a:latin typeface="Metropolis" pitchFamily="34" charset="0"/>
                           <a:ea typeface="Metropolis" pitchFamily="34" charset="-122"/>
                           <a:cs typeface="Metropolis" pitchFamily="34" charset="-120"/>
-                          <a:hlinkClick r:id="rId2" invalidUrl="" action="" tgtFrame="" tooltip="" history="1" highlightClick="0" endSnd="0">
+                          <a:hlinkClick r:id="" action="ppaction://noaction">
                             <a:extLst>
                               <a:ext uri="{A12FA001-AC4F-418D-AE19-62706E023703}">
                                 <ahyp:hlinkClr xmlns:ahyp="http://schemas.microsoft.com/office/drawing/2018/hyperlinkcolor" val="tx"/>
@@ -4885,9 +4733,6 @@
                         </a:rPr>
                         <a:t>www.icapital.com</a:t>
                       </a:r>
-                      <a:pPr algn="r" indent="0" marL="0">
-                        <a:buNone/>
-                      </a:pPr>
                       <a:r>
                         <a:rPr lang="en-US" sz="800" dirty="0">
                           <a:solidFill>
@@ -4906,7 +4751,7 @@
                       </a:endParaRPr>
                     </a:p>
                   </a:txBody>
-                  <a:tcPr marL="91440" marR="91440" marT="45720" marB="45720">
+                  <a:tcPr>
                     <a:lnL w="0" cap="flat" cmpd="sng" algn="ctr">
                       <a:noFill/>
                     </a:lnL>
@@ -4921,6 +4766,11 @@
                     </a:lnB>
                   </a:tcPr>
                 </a:tc>
+                <a:extLst>
+                  <a:ext uri="{0D108BD9-81ED-4DB2-BD59-A6C34878D82A}">
+                    <a16:rowId xmlns:a16="http://schemas.microsoft.com/office/drawing/2014/main" val="10000"/>
+                  </a:ext>
+                </a:extLst>
               </a:tr>
             </a:tbl>
           </a:graphicData>
@@ -4947,7 +4797,7 @@
           <a:bodyPr wrap="square" rtlCol="0" anchor="ctr"/>
           <a:lstStyle/>
           <a:p>
-            <a:pPr algn="l" indent="0" marL="0">
+            <a:pPr marL="0" indent="0" algn="l">
               <a:buNone/>
             </a:pPr>
             <a:r>
@@ -4988,9 +4838,27 @@
             <a:tbl>
               <a:tblPr/>
               <a:tblGrid>
-                <a:gridCol w="2316480"/>
-                <a:gridCol w="2316480"/>
-                <a:gridCol w="2316480"/>
+                <a:gridCol w="2316480">
+                  <a:extLst>
+                    <a:ext uri="{9D8B030D-6E8A-4147-A177-3AD203B41FA5}">
+                      <a16:colId xmlns:a16="http://schemas.microsoft.com/office/drawing/2014/main" val="20000"/>
+                    </a:ext>
+                  </a:extLst>
+                </a:gridCol>
+                <a:gridCol w="2316480">
+                  <a:extLst>
+                    <a:ext uri="{9D8B030D-6E8A-4147-A177-3AD203B41FA5}">
+                      <a16:colId xmlns:a16="http://schemas.microsoft.com/office/drawing/2014/main" val="20001"/>
+                    </a:ext>
+                  </a:extLst>
+                </a:gridCol>
+                <a:gridCol w="2316480">
+                  <a:extLst>
+                    <a:ext uri="{9D8B030D-6E8A-4147-A177-3AD203B41FA5}">
+                      <a16:colId xmlns:a16="http://schemas.microsoft.com/office/drawing/2014/main" val="20002"/>
+                    </a:ext>
+                  </a:extLst>
+                </a:gridCol>
               </a:tblGrid>
               <a:tr h="6949440">
                 <a:tc>
@@ -4998,7 +4866,7 @@
                     <a:bodyPr/>
                     <a:lstStyle/>
                     <a:p>
-                      <a:pPr algn="l" indent="0" marL="0">
+                      <a:pPr marL="0" indent="0" algn="l">
                         <a:buNone/>
                       </a:pPr>
                       <a:r>
@@ -5019,7 +4887,7 @@
                       </a:endParaRPr>
                     </a:p>
                     <a:p>
-                      <a:pPr algn="l" indent="0" marL="0">
+                      <a:pPr marL="0" indent="0" algn="l">
                         <a:buNone/>
                       </a:pPr>
                       <a:endParaRPr lang="en-US" sz="800" dirty="0">
@@ -5029,7 +4897,7 @@
                       </a:endParaRPr>
                     </a:p>
                     <a:p>
-                      <a:pPr algn="l" indent="0" marL="0">
+                      <a:pPr marL="0" indent="0" algn="l">
                         <a:buNone/>
                       </a:pPr>
                       <a:r>
@@ -5050,7 +4918,7 @@
                       </a:endParaRPr>
                     </a:p>
                     <a:p>
-                      <a:pPr algn="l" indent="0" marL="0">
+                      <a:pPr marL="0" indent="0" algn="l">
                         <a:buNone/>
                       </a:pPr>
                       <a:endParaRPr lang="en-US" sz="800" dirty="0">
@@ -5060,7 +4928,7 @@
                       </a:endParaRPr>
                     </a:p>
                     <a:p>
-                      <a:pPr algn="l" indent="0" marL="0">
+                      <a:pPr marL="0" indent="0" algn="l">
                         <a:buNone/>
                       </a:pPr>
                       <a:r>
@@ -5081,7 +4949,7 @@
                       </a:endParaRPr>
                     </a:p>
                     <a:p>
-                      <a:pPr algn="l" indent="0" marL="0">
+                      <a:pPr marL="0" indent="0" algn="l">
                         <a:buNone/>
                       </a:pPr>
                       <a:endParaRPr lang="en-US" sz="800" dirty="0">
@@ -5091,7 +4959,7 @@
                       </a:endParaRPr>
                     </a:p>
                     <a:p>
-                      <a:pPr algn="l" indent="0" marL="0">
+                      <a:pPr marL="0" indent="0" algn="l">
                         <a:buNone/>
                       </a:pPr>
                       <a:r>
@@ -5112,7 +4980,7 @@
                       </a:endParaRPr>
                     </a:p>
                     <a:p>
-                      <a:pPr algn="l" indent="0" marL="0">
+                      <a:pPr marL="0" indent="0" algn="l">
                         <a:buNone/>
                       </a:pPr>
                       <a:endParaRPr lang="en-US" sz="800" dirty="0">
@@ -5122,7 +4990,7 @@
                       </a:endParaRPr>
                     </a:p>
                     <a:p>
-                      <a:pPr algn="l" indent="0" marL="0">
+                      <a:pPr marL="0" indent="0" algn="l">
                         <a:buNone/>
                       </a:pPr>
                       <a:r>
@@ -5143,7 +5011,7 @@
                       </a:endParaRPr>
                     </a:p>
                   </a:txBody>
-                  <a:tcPr marL="91440" marR="91440" marT="45720" marB="45720">
+                  <a:tcPr>
                     <a:lnL w="0" cap="flat" cmpd="sng" algn="ctr">
                       <a:noFill/>
                     </a:lnL>
@@ -5163,7 +5031,7 @@
                     <a:bodyPr/>
                     <a:lstStyle/>
                     <a:p>
-                      <a:pPr algn="l" indent="0" marL="0">
+                      <a:pPr marL="0" indent="0" algn="l">
                         <a:buNone/>
                       </a:pPr>
                       <a:r>
@@ -5185,7 +5053,7 @@
                       </a:endParaRPr>
                     </a:p>
                     <a:p>
-                      <a:pPr algn="l" indent="0" marL="0">
+                      <a:pPr marL="0" indent="0" algn="l">
                         <a:buNone/>
                       </a:pPr>
                       <a:r>
@@ -5207,7 +5075,7 @@
                       </a:endParaRPr>
                     </a:p>
                     <a:p>
-                      <a:pPr algn="l" indent="0" marL="0">
+                      <a:pPr marL="0" indent="0" algn="l">
                         <a:buNone/>
                       </a:pPr>
                       <a:r>
@@ -5228,7 +5096,7 @@
                       </a:endParaRPr>
                     </a:p>
                     <a:p>
-                      <a:pPr algn="l" indent="0" marL="0">
+                      <a:pPr marL="0" indent="0" algn="l">
                         <a:buNone/>
                       </a:pPr>
                       <a:r>
@@ -5242,21 +5110,7 @@
                         </a:rPr>
                         <a:t>
 AIFMD does not restrict a European investor from investing in a fund on its own initiative. The manager may accept any such investor into the access funds only if it satisfied that it would not be in breach of any applicable law or regulation and that such investor is otherwise eligible under the laws of such EEA member state or the UK to invest in the access funds. If European investors invest in the access funds on their own initiative, they will not receive the protections or benefits available under the AIFMD.
-</a:t>
-                      </a:r>
-                      <a:pPr algn="l" indent="0" marL="0">
-                        <a:buNone/>
-                      </a:pPr>
-                      <a:r>
-                        <a:rPr lang="en-US" sz="800" dirty="0">
-                          <a:solidFill>
-                            <a:srgbClr val="2F4251"/>
-                          </a:solidFill>
-                          <a:latin typeface="Metropolis" pitchFamily="34" charset="0"/>
-                          <a:ea typeface="Metropolis" pitchFamily="34" charset="-122"/>
-                          <a:cs typeface="Metropolis" pitchFamily="34" charset="-120"/>
-                        </a:rPr>
-                        <a:t>This material is only made available to a European investor which qualifies as a “professional client” under the markets in financial instruments directive (2014/65/EU). Accordingly, no key information document required by regulation (EU) no 1286/2014 (the “Priips regulation”) for offering or selling interests in the access funds or otherwise making them available to retail investors in the EEA or the UK has been prepared. Offering or selling the interests in the access funds or otherwise making them available to any retail investor in the EEA or the UK may be unlawful under the Priips regulation.
+This material is only made available to a European investor which qualifies as a “professional client” under the markets in financial instruments directive (2014/65/EU). Accordingly, no key information document required by regulation (EU) no 1286/2014 (the “Priips regulation”) for offering or selling interests in the access funds or otherwise making them available to retail investors in the EEA or the UK has been prepared. Offering or selling the interests in the access funds or otherwise making them available to any retail investor in the EEA or the UK may be unlawful under the Priips regulation.
 </a:t>
                       </a:r>
                       <a:endParaRPr lang="en-US" sz="800" dirty="0">
@@ -5266,7 +5120,7 @@
                       </a:endParaRPr>
                     </a:p>
                   </a:txBody>
-                  <a:tcPr marL="91440" marR="91440" marT="45720" marB="45720">
+                  <a:tcPr>
                     <a:lnL w="0" cap="flat" cmpd="sng" algn="ctr">
                       <a:noFill/>
                     </a:lnL>
@@ -5286,7 +5140,7 @@
                     <a:bodyPr/>
                     <a:lstStyle/>
                     <a:p>
-                      <a:pPr algn="l" indent="0" marL="0">
+                      <a:pPr marL="0" indent="0" algn="l">
                         <a:buNone/>
                       </a:pPr>
                       <a:r>
@@ -5301,9 +5155,6 @@
                         <a:t>The offering of interests in the access funds is not subject to a requirement to publish a prospectus under regulation (EU) no 2017/1129 (the “prospectus regulation”) on the basis that the minimum investment amount is more than 100,000 EUR per investor and therefore an exemption to the obligation to publish a prospectus applies.
 </a:t>
                       </a:r>
-                      <a:pPr algn="l" indent="0" marL="0">
-                        <a:buNone/>
-                      </a:pPr>
                       <a:r>
                         <a:rPr lang="en-US" sz="800" b="1" dirty="0">
                           <a:solidFill>
@@ -5322,7 +5173,7 @@
                       </a:endParaRPr>
                     </a:p>
                     <a:p>
-                      <a:pPr algn="l" indent="0" marL="0">
+                      <a:pPr marL="0" indent="0" algn="l">
                         <a:buNone/>
                       </a:pPr>
                       <a:r>
@@ -5343,7 +5194,7 @@
                       </a:endParaRPr>
                     </a:p>
                     <a:p>
-                      <a:pPr algn="l" indent="0" marL="0">
+                      <a:pPr marL="0" indent="0" algn="l">
                         <a:buNone/>
                       </a:pPr>
                       <a:r>
@@ -5364,10 +5215,10 @@
                       </a:endParaRPr>
                     </a:p>
                     <a:p>
-                      <a:pPr algn="l" marL="342900" indent="-342900">
+                      <a:pPr marL="342900" indent="-342900" algn="l">
                         <a:buSzPct val="100000"/>
                         <a:buFont typeface="+mj-lt"/>
-                        <a:buAutoNum type="romanUcPeriod" startAt="1"/>
+                        <a:buAutoNum type="romanUcPeriod"/>
                       </a:pPr>
                       <a:endParaRPr lang="en-US" sz="800" dirty="0">
                         <a:latin typeface="Metropolis" charset="0"/>
@@ -5376,10 +5227,10 @@
                       </a:endParaRPr>
                     </a:p>
                     <a:p>
-                      <a:pPr algn="l" marL="342900" indent="-342900">
+                      <a:pPr marL="342900" indent="-342900" algn="l">
                         <a:buSzPct val="100000"/>
                         <a:buFont typeface="+mj-lt"/>
-                        <a:buAutoNum type="romanUcPeriod" startAt="1"/>
+                        <a:buAutoNum type="romanUcPeriod"/>
                       </a:pPr>
                       <a:r>
                         <a:rPr lang="en-US" sz="800" dirty="0">
@@ -5399,10 +5250,10 @@
                       </a:endParaRPr>
                     </a:p>
                     <a:p>
-                      <a:pPr algn="l" marL="342900" indent="-342900">
+                      <a:pPr marL="342900" indent="-342900" algn="l">
                         <a:buSzPct val="100000"/>
                         <a:buFont typeface="+mj-lt"/>
-                        <a:buAutoNum type="romanUcPeriod" startAt="1"/>
+                        <a:buAutoNum type="romanUcPeriod"/>
                       </a:pPr>
                       <a:endParaRPr lang="en-US" sz="800" dirty="0">
                         <a:latin typeface="Metropolis" charset="0"/>
@@ -5411,10 +5262,10 @@
                       </a:endParaRPr>
                     </a:p>
                     <a:p>
-                      <a:pPr algn="l" marL="342900" indent="-342900">
+                      <a:pPr marL="342900" indent="-342900" algn="l">
                         <a:buSzPct val="100000"/>
                         <a:buFont typeface="+mj-lt"/>
-                        <a:buAutoNum type="romanUcPeriod" startAt="1"/>
+                        <a:buAutoNum type="romanUcPeriod"/>
                       </a:pPr>
                       <a:r>
                         <a:rPr lang="en-US" sz="800" dirty="0">
@@ -5434,10 +5285,10 @@
                       </a:endParaRPr>
                     </a:p>
                     <a:p>
-                      <a:pPr algn="l" marL="342900" indent="-342900">
+                      <a:pPr marL="342900" indent="-342900" algn="l">
                         <a:buSzPct val="100000"/>
                         <a:buFont typeface="+mj-lt"/>
-                        <a:buAutoNum type="romanUcPeriod" startAt="1"/>
+                        <a:buAutoNum type="romanUcPeriod"/>
                       </a:pPr>
                       <a:endParaRPr lang="en-US" sz="800" dirty="0">
                         <a:latin typeface="Metropolis" charset="0"/>
@@ -5446,10 +5297,10 @@
                       </a:endParaRPr>
                     </a:p>
                     <a:p>
-                      <a:pPr algn="l" marL="342900" indent="-342900">
+                      <a:pPr marL="342900" indent="-342900" algn="l">
                         <a:buSzPct val="100000"/>
                         <a:buFont typeface="+mj-lt"/>
-                        <a:buAutoNum type="romanUcPeriod" startAt="1"/>
+                        <a:buAutoNum type="romanUcPeriod"/>
                       </a:pPr>
                       <a:r>
                         <a:rPr lang="en-US" sz="800" dirty="0">
@@ -5469,7 +5320,7 @@
                       </a:endParaRPr>
                     </a:p>
                     <a:p>
-                      <a:pPr algn="l" indent="0" marL="0">
+                      <a:pPr marL="0" indent="0" algn="l">
                         <a:buNone/>
                       </a:pPr>
                       <a:endParaRPr lang="en-US" sz="800" dirty="0">
@@ -5479,7 +5330,7 @@
                       </a:endParaRPr>
                     </a:p>
                     <a:p>
-                      <a:pPr algn="l" indent="0" marL="0">
+                      <a:pPr marL="0" indent="0" algn="l">
                         <a:buNone/>
                       </a:pPr>
                       <a:r>
@@ -5500,7 +5351,7 @@
                       </a:endParaRPr>
                     </a:p>
                     <a:p>
-                      <a:pPr algn="l" indent="0" marL="0">
+                      <a:pPr marL="0" indent="0" algn="l">
                         <a:buNone/>
                       </a:pPr>
                       <a:r>
@@ -5523,7 +5374,7 @@
                       </a:endParaRPr>
                     </a:p>
                     <a:p>
-                      <a:pPr algn="l" indent="0" marL="0">
+                      <a:pPr marL="0" indent="0" algn="l">
                         <a:buNone/>
                       </a:pPr>
                       <a:r>
@@ -5544,7 +5395,7 @@
                       </a:endParaRPr>
                     </a:p>
                     <a:p>
-                      <a:pPr algn="l" indent="0" marL="0">
+                      <a:pPr marL="0" indent="0" algn="l">
                         <a:buNone/>
                       </a:pPr>
                       <a:r>
@@ -5567,7 +5418,7 @@
                       </a:endParaRPr>
                     </a:p>
                   </a:txBody>
-                  <a:tcPr marL="91440" marR="91440" marT="45720" marB="45720">
+                  <a:tcPr>
                     <a:lnL w="0" cap="flat" cmpd="sng" algn="ctr">
                       <a:noFill/>
                     </a:lnL>
@@ -5582,6 +5433,11 @@
                     </a:lnB>
                   </a:tcPr>
                 </a:tc>
+                <a:extLst>
+                  <a:ext uri="{0D108BD9-81ED-4DB2-BD59-A6C34878D82A}">
+                    <a16:rowId xmlns:a16="http://schemas.microsoft.com/office/drawing/2014/main" val="10000"/>
+                  </a:ext>
+                </a:extLst>
               </a:tr>
             </a:tbl>
           </a:graphicData>
@@ -5603,6 +5459,7 @@
         <a:solidFill>
           <a:srgbClr val="FFFFFF"/>
         </a:solidFill>
+        <a:effectLst/>
       </p:bgPr>
     </p:bg>
     <p:spTree>
@@ -5621,14 +5478,14 @@
       </p:grpSpPr>
       <p:pic>
         <p:nvPicPr>
-          <p:cNvPr id="2" name="Image 0" descr="preencoded.png">    </p:cNvPr>
+          <p:cNvPr id="2" name="Image 0" descr="preencoded.png"/>
           <p:cNvPicPr>
             <a:picLocks noChangeAspect="1"/>
           </p:cNvPicPr>
           <p:nvPr/>
         </p:nvPicPr>
         <p:blipFill>
-          <a:blip r:embed="rId1"/>
+          <a:blip r:embed="rId3"/>
           <a:stretch>
             <a:fillRect/>
           </a:stretch>
@@ -5664,7 +5521,7 @@
           <a:bodyPr wrap="square" rtlCol="0" anchor="ctr"/>
           <a:lstStyle/>
           <a:p>
-            <a:pPr algn="l" indent="0" marL="0">
+            <a:pPr marL="0" indent="0" algn="l">
               <a:buNone/>
             </a:pPr>
             <a:r>
@@ -5681,7 +5538,7 @@
             <a:endParaRPr lang="en-US" sz="1400" dirty="0"/>
           </a:p>
           <a:p>
-            <a:pPr algn="l" indent="0" marL="0">
+            <a:pPr marL="0" indent="0" algn="l">
               <a:buNone/>
             </a:pPr>
             <a:r>
@@ -5720,7 +5577,7 @@
           <a:bodyPr wrap="square" rtlCol="0" anchor="ctr"/>
           <a:lstStyle/>
           <a:p>
-            <a:pPr algn="l" indent="0" marL="0">
+            <a:pPr marL="0" indent="0" algn="l">
               <a:buNone/>
             </a:pPr>
             <a:r>
@@ -5759,7 +5616,7 @@
           <a:bodyPr wrap="square" rtlCol="0" anchor="ctr"/>
           <a:lstStyle/>
           <a:p>
-            <a:pPr algn="l" indent="0" marL="0">
+            <a:pPr marL="0" indent="0" algn="l">
               <a:buNone/>
             </a:pPr>
             <a:endParaRPr lang="en-US" sz="1600" dirty="0"/>
@@ -5788,6 +5645,13 @@
             <a:prstDash val="solid"/>
           </a:ln>
         </p:spPr>
+        <p:txBody>
+          <a:bodyPr/>
+          <a:lstStyle/>
+          <a:p>
+            <a:endParaRPr lang="pt-BR"/>
+          </a:p>
+        </p:txBody>
       </p:sp>
       <p:graphicFrame>
         <p:nvGraphicFramePr>
@@ -5812,17 +5676,35 @@
             <a:tbl>
               <a:tblPr/>
               <a:tblGrid>
-                <a:gridCol w="2011680"/>
-                <a:gridCol w="2926080"/>
-                <a:gridCol w="2011680"/>
+                <a:gridCol w="2011680">
+                  <a:extLst>
+                    <a:ext uri="{9D8B030D-6E8A-4147-A177-3AD203B41FA5}">
+                      <a16:colId xmlns:a16="http://schemas.microsoft.com/office/drawing/2014/main" val="20000"/>
+                    </a:ext>
+                  </a:extLst>
+                </a:gridCol>
+                <a:gridCol w="2926080">
+                  <a:extLst>
+                    <a:ext uri="{9D8B030D-6E8A-4147-A177-3AD203B41FA5}">
+                      <a16:colId xmlns:a16="http://schemas.microsoft.com/office/drawing/2014/main" val="20001"/>
+                    </a:ext>
+                  </a:extLst>
+                </a:gridCol>
+                <a:gridCol w="2011680">
+                  <a:extLst>
+                    <a:ext uri="{9D8B030D-6E8A-4147-A177-3AD203B41FA5}">
+                      <a16:colId xmlns:a16="http://schemas.microsoft.com/office/drawing/2014/main" val="20002"/>
+                    </a:ext>
+                  </a:extLst>
+                </a:gridCol>
               </a:tblGrid>
-              <a:tr h="91440">
+              <a:tr h="0">
                 <a:tc>
                   <a:txBody>
                     <a:bodyPr/>
                     <a:lstStyle/>
                     <a:p>
-                      <a:pPr algn="l" indent="0" marL="0">
+                      <a:pPr marL="0" indent="0" algn="l">
                         <a:buNone/>
                       </a:pPr>
                       <a:r>
@@ -5843,7 +5725,7 @@
                       </a:endParaRPr>
                     </a:p>
                   </a:txBody>
-                  <a:tcPr marL="91440" marR="91440" marT="45720" marB="45720">
+                  <a:tcPr>
                     <a:lnL w="0" cap="flat" cmpd="sng" algn="ctr">
                       <a:noFill/>
                     </a:lnL>
@@ -5863,7 +5745,7 @@
                     <a:bodyPr/>
                     <a:lstStyle/>
                     <a:p>
-                      <a:pPr algn="ctr" indent="0" marL="0">
+                      <a:pPr marL="0" indent="0" algn="ctr">
                         <a:buNone/>
                       </a:pPr>
                       <a:r>
@@ -5884,7 +5766,7 @@
                       </a:endParaRPr>
                     </a:p>
                   </a:txBody>
-                  <a:tcPr marL="91440" marR="91440" marT="45720" marB="45720">
+                  <a:tcPr>
                     <a:lnL w="0" cap="flat" cmpd="sng" algn="ctr">
                       <a:noFill/>
                     </a:lnL>
@@ -5904,7 +5786,7 @@
                     <a:bodyPr/>
                     <a:lstStyle/>
                     <a:p>
-                      <a:pPr algn="r" indent="0" marL="0">
+                      <a:pPr marL="0" indent="0" algn="r">
                         <a:buNone/>
                       </a:pPr>
                       <a:r>
@@ -5915,7 +5797,7 @@
                           <a:latin typeface="Metropolis" pitchFamily="34" charset="0"/>
                           <a:ea typeface="Metropolis" pitchFamily="34" charset="-122"/>
                           <a:cs typeface="Metropolis" pitchFamily="34" charset="-120"/>
-                          <a:hlinkClick r:id="rId2" invalidUrl="" action="" tgtFrame="" tooltip="" history="1" highlightClick="0" endSnd="0">
+                          <a:hlinkClick r:id="" action="ppaction://noaction">
                             <a:extLst>
                               <a:ext uri="{A12FA001-AC4F-418D-AE19-62706E023703}">
                                 <ahyp:hlinkClr xmlns:ahyp="http://schemas.microsoft.com/office/drawing/2018/hyperlinkcolor" val="tx"/>
@@ -5925,9 +5807,6 @@
                         </a:rPr>
                         <a:t>www.icapital.com</a:t>
                       </a:r>
-                      <a:pPr algn="r" indent="0" marL="0">
-                        <a:buNone/>
-                      </a:pPr>
                       <a:r>
                         <a:rPr lang="en-US" sz="800" dirty="0">
                           <a:solidFill>
@@ -5946,7 +5825,7 @@
                       </a:endParaRPr>
                     </a:p>
                   </a:txBody>
-                  <a:tcPr marL="91440" marR="91440" marT="45720" marB="45720">
+                  <a:tcPr>
                     <a:lnL w="0" cap="flat" cmpd="sng" algn="ctr">
                       <a:noFill/>
                     </a:lnL>
@@ -5961,6 +5840,11 @@
                     </a:lnB>
                   </a:tcPr>
                 </a:tc>
+                <a:extLst>
+                  <a:ext uri="{0D108BD9-81ED-4DB2-BD59-A6C34878D82A}">
+                    <a16:rowId xmlns:a16="http://schemas.microsoft.com/office/drawing/2014/main" val="10000"/>
+                  </a:ext>
+                </a:extLst>
               </a:tr>
             </a:tbl>
           </a:graphicData>
@@ -5987,7 +5871,7 @@
           <a:bodyPr wrap="square" rtlCol="0" anchor="ctr"/>
           <a:lstStyle/>
           <a:p>
-            <a:pPr algn="l" indent="0" marL="0">
+            <a:pPr marL="0" indent="0" algn="l">
               <a:buNone/>
             </a:pPr>
             <a:r>
@@ -6028,9 +5912,27 @@
             <a:tbl>
               <a:tblPr/>
               <a:tblGrid>
-                <a:gridCol w="2316480"/>
-                <a:gridCol w="2316480"/>
-                <a:gridCol w="2316480"/>
+                <a:gridCol w="2316480">
+                  <a:extLst>
+                    <a:ext uri="{9D8B030D-6E8A-4147-A177-3AD203B41FA5}">
+                      <a16:colId xmlns:a16="http://schemas.microsoft.com/office/drawing/2014/main" val="20000"/>
+                    </a:ext>
+                  </a:extLst>
+                </a:gridCol>
+                <a:gridCol w="2316480">
+                  <a:extLst>
+                    <a:ext uri="{9D8B030D-6E8A-4147-A177-3AD203B41FA5}">
+                      <a16:colId xmlns:a16="http://schemas.microsoft.com/office/drawing/2014/main" val="20001"/>
+                    </a:ext>
+                  </a:extLst>
+                </a:gridCol>
+                <a:gridCol w="2316480">
+                  <a:extLst>
+                    <a:ext uri="{9D8B030D-6E8A-4147-A177-3AD203B41FA5}">
+                      <a16:colId xmlns:a16="http://schemas.microsoft.com/office/drawing/2014/main" val="20002"/>
+                    </a:ext>
+                  </a:extLst>
+                </a:gridCol>
               </a:tblGrid>
               <a:tr h="6949440">
                 <a:tc>
@@ -6038,7 +5940,7 @@
                     <a:bodyPr/>
                     <a:lstStyle/>
                     <a:p>
-                      <a:pPr algn="l" indent="0" marL="0">
+                      <a:pPr marL="0" indent="0" algn="l">
                         <a:buNone/>
                       </a:pPr>
                       <a:r>
@@ -6059,7 +5961,7 @@
                       </a:endParaRPr>
                     </a:p>
                     <a:p>
-                      <a:pPr algn="l" indent="0" marL="0">
+                      <a:pPr marL="0" indent="0" algn="l">
                         <a:buNone/>
                       </a:pPr>
                       <a:endParaRPr lang="en-US" sz="800" dirty="0">
@@ -6069,7 +5971,7 @@
                       </a:endParaRPr>
                     </a:p>
                     <a:p>
-                      <a:pPr algn="l" indent="0" marL="0">
+                      <a:pPr marL="0" indent="0" algn="l">
                         <a:buNone/>
                       </a:pPr>
                       <a:r>
@@ -6090,7 +5992,7 @@
                       </a:endParaRPr>
                     </a:p>
                   </a:txBody>
-                  <a:tcPr marL="91440" marR="91440" marT="45720" marB="45720">
+                  <a:tcPr>
                     <a:lnL w="0" cap="flat" cmpd="sng" algn="ctr">
                       <a:noFill/>
                     </a:lnL>
@@ -6110,7 +6012,7 @@
                     <a:bodyPr/>
                     <a:lstStyle/>
                     <a:p>
-                      <a:pPr algn="l" indent="0" marL="0">
+                      <a:pPr marL="0" indent="0" algn="l">
                         <a:buNone/>
                       </a:pPr>
                       <a:endParaRPr lang="en-US" sz="800" dirty="0">
@@ -6120,7 +6022,7 @@
                       </a:endParaRPr>
                     </a:p>
                   </a:txBody>
-                  <a:tcPr marL="91440" marR="91440" marT="45720" marB="45720">
+                  <a:tcPr>
                     <a:lnL w="0" cap="flat" cmpd="sng" algn="ctr">
                       <a:noFill/>
                     </a:lnL>
@@ -6140,7 +6042,7 @@
                     <a:bodyPr/>
                     <a:lstStyle/>
                     <a:p>
-                      <a:pPr algn="l" indent="0" marL="0">
+                      <a:pPr marL="0" indent="0" algn="l">
                         <a:buNone/>
                       </a:pPr>
                       <a:endParaRPr lang="en-US" sz="800" dirty="0">
@@ -6150,7 +6052,7 @@
                       </a:endParaRPr>
                     </a:p>
                   </a:txBody>
-                  <a:tcPr marL="91440" marR="91440" marT="45720" marB="45720">
+                  <a:tcPr>
                     <a:lnL w="0" cap="flat" cmpd="sng" algn="ctr">
                       <a:noFill/>
                     </a:lnL>
@@ -6165,6 +6067,11 @@
                     </a:lnB>
                   </a:tcPr>
                 </a:tc>
+                <a:extLst>
+                  <a:ext uri="{0D108BD9-81ED-4DB2-BD59-A6C34878D82A}">
+                    <a16:rowId xmlns:a16="http://schemas.microsoft.com/office/drawing/2014/main" val="10000"/>
+                  </a:ext>
+                </a:extLst>
               </a:tr>
             </a:tbl>
           </a:graphicData>
@@ -6471,4 +6378,319 @@
     </a:ext>
   </a:extLst>
 </a:theme>
+</file>
+
+<file path=ppt/theme/theme2.xml><?xml version="1.0" encoding="utf-8"?>
+<a:theme xmlns:a="http://schemas.openxmlformats.org/drawingml/2006/main" name="Tema do Office">
+  <a:themeElements>
+    <a:clrScheme name="Office">
+      <a:dk1>
+        <a:sysClr val="windowText" lastClr="000000"/>
+      </a:dk1>
+      <a:lt1>
+        <a:sysClr val="window" lastClr="FFFFFF"/>
+      </a:lt1>
+      <a:dk2>
+        <a:srgbClr val="0E2841"/>
+      </a:dk2>
+      <a:lt2>
+        <a:srgbClr val="E8E8E8"/>
+      </a:lt2>
+      <a:accent1>
+        <a:srgbClr val="156082"/>
+      </a:accent1>
+      <a:accent2>
+        <a:srgbClr val="E97132"/>
+      </a:accent2>
+      <a:accent3>
+        <a:srgbClr val="196B24"/>
+      </a:accent3>
+      <a:accent4>
+        <a:srgbClr val="0F9ED5"/>
+      </a:accent4>
+      <a:accent5>
+        <a:srgbClr val="A02B93"/>
+      </a:accent5>
+      <a:accent6>
+        <a:srgbClr val="4EA72E"/>
+      </a:accent6>
+      <a:hlink>
+        <a:srgbClr val="467886"/>
+      </a:hlink>
+      <a:folHlink>
+        <a:srgbClr val="96607D"/>
+      </a:folHlink>
+    </a:clrScheme>
+    <a:fontScheme name="Office">
+      <a:majorFont>
+        <a:latin typeface="Aptos Display" panose="02110004020202020204"/>
+        <a:ea typeface=""/>
+        <a:cs typeface=""/>
+        <a:font script="Jpan" typeface="游ゴシック Light"/>
+        <a:font script="Hang" typeface="맑은 고딕"/>
+        <a:font script="Hans" typeface="等线 Light"/>
+        <a:font script="Hant" typeface="新細明體"/>
+        <a:font script="Arab" typeface="Times New Roman"/>
+        <a:font script="Hebr" typeface="Times New Roman"/>
+        <a:font script="Thai" typeface="Angsana New"/>
+        <a:font script="Ethi" typeface="Nyala"/>
+        <a:font script="Beng" typeface="Vrinda"/>
+        <a:font script="Gujr" typeface="Shruti"/>
+        <a:font script="Khmr" typeface="MoolBoran"/>
+        <a:font script="Knda" typeface="Tunga"/>
+        <a:font script="Guru" typeface="Raavi"/>
+        <a:font script="Cans" typeface="Euphemia"/>
+        <a:font script="Cher" typeface="Plantagenet Cherokee"/>
+        <a:font script="Yiii" typeface="Microsoft Yi Baiti"/>
+        <a:font script="Tibt" typeface="Microsoft Himalaya"/>
+        <a:font script="Thaa" typeface="MV Boli"/>
+        <a:font script="Deva" typeface="Mangal"/>
+        <a:font script="Telu" typeface="Gautami"/>
+        <a:font script="Taml" typeface="Latha"/>
+        <a:font script="Syrc" typeface="Estrangelo Edessa"/>
+        <a:font script="Orya" typeface="Kalinga"/>
+        <a:font script="Mlym" typeface="Kartika"/>
+        <a:font script="Laoo" typeface="DokChampa"/>
+        <a:font script="Sinh" typeface="Iskoola Pota"/>
+        <a:font script="Mong" typeface="Mongolian Baiti"/>
+        <a:font script="Viet" typeface="Times New Roman"/>
+        <a:font script="Uigh" typeface="Microsoft Uighur"/>
+        <a:font script="Geor" typeface="Sylfaen"/>
+        <a:font script="Armn" typeface="Arial"/>
+        <a:font script="Bugi" typeface="Leelawadee UI"/>
+        <a:font script="Bopo" typeface="Microsoft JhengHei"/>
+        <a:font script="Java" typeface="Javanese Text"/>
+        <a:font script="Lisu" typeface="Segoe UI"/>
+        <a:font script="Mymr" typeface="Myanmar Text"/>
+        <a:font script="Nkoo" typeface="Ebrima"/>
+        <a:font script="Olck" typeface="Nirmala UI"/>
+        <a:font script="Osma" typeface="Ebrima"/>
+        <a:font script="Phag" typeface="Phagspa"/>
+        <a:font script="Syrn" typeface="Estrangelo Edessa"/>
+        <a:font script="Syrj" typeface="Estrangelo Edessa"/>
+        <a:font script="Syre" typeface="Estrangelo Edessa"/>
+        <a:font script="Sora" typeface="Nirmala UI"/>
+        <a:font script="Tale" typeface="Microsoft Tai Le"/>
+        <a:font script="Talu" typeface="Microsoft New Tai Lue"/>
+        <a:font script="Tfng" typeface="Ebrima"/>
+      </a:majorFont>
+      <a:minorFont>
+        <a:latin typeface="Aptos" panose="02110004020202020204"/>
+        <a:ea typeface=""/>
+        <a:cs typeface=""/>
+        <a:font script="Jpan" typeface="游ゴシック"/>
+        <a:font script="Hang" typeface="맑은 고딕"/>
+        <a:font script="Hans" typeface="等线"/>
+        <a:font script="Hant" typeface="新細明體"/>
+        <a:font script="Arab" typeface="Arial"/>
+        <a:font script="Hebr" typeface="Arial"/>
+        <a:font script="Thai" typeface="Cordia New"/>
+        <a:font script="Ethi" typeface="Nyala"/>
+        <a:font script="Beng" typeface="Vrinda"/>
+        <a:font script="Gujr" typeface="Shruti"/>
+        <a:font script="Khmr" typeface="DaunPenh"/>
+        <a:font script="Knda" typeface="Tunga"/>
+        <a:font script="Guru" typeface="Raavi"/>
+        <a:font script="Cans" typeface="Euphemia"/>
+        <a:font script="Cher" typeface="Plantagenet Cherokee"/>
+        <a:font script="Yiii" typeface="Microsoft Yi Baiti"/>
+        <a:font script="Tibt" typeface="Microsoft Himalaya"/>
+        <a:font script="Thaa" typeface="MV Boli"/>
+        <a:font script="Deva" typeface="Mangal"/>
+        <a:font script="Telu" typeface="Gautami"/>
+        <a:font script="Taml" typeface="Latha"/>
+        <a:font script="Syrc" typeface="Estrangelo Edessa"/>
+        <a:font script="Orya" typeface="Kalinga"/>
+        <a:font script="Mlym" typeface="Kartika"/>
+        <a:font script="Laoo" typeface="DokChampa"/>
+        <a:font script="Sinh" typeface="Iskoola Pota"/>
+        <a:font script="Mong" typeface="Mongolian Baiti"/>
+        <a:font script="Viet" typeface="Arial"/>
+        <a:font script="Uigh" typeface="Microsoft Uighur"/>
+        <a:font script="Geor" typeface="Sylfaen"/>
+        <a:font script="Armn" typeface="Arial"/>
+        <a:font script="Bugi" typeface="Leelawadee UI"/>
+        <a:font script="Bopo" typeface="Microsoft JhengHei"/>
+        <a:font script="Java" typeface="Javanese Text"/>
+        <a:font script="Lisu" typeface="Segoe UI"/>
+        <a:font script="Mymr" typeface="Myanmar Text"/>
+        <a:font script="Nkoo" typeface="Ebrima"/>
+        <a:font script="Olck" typeface="Nirmala UI"/>
+        <a:font script="Osma" typeface="Ebrima"/>
+        <a:font script="Phag" typeface="Phagspa"/>
+        <a:font script="Syrn" typeface="Estrangelo Edessa"/>
+        <a:font script="Syrj" typeface="Estrangelo Edessa"/>
+        <a:font script="Syre" typeface="Estrangelo Edessa"/>
+        <a:font script="Sora" typeface="Nirmala UI"/>
+        <a:font script="Tale" typeface="Microsoft Tai Le"/>
+        <a:font script="Talu" typeface="Microsoft New Tai Lue"/>
+        <a:font script="Tfng" typeface="Ebrima"/>
+      </a:minorFont>
+    </a:fontScheme>
+    <a:fmtScheme name="Office">
+      <a:fillStyleLst>
+        <a:solidFill>
+          <a:schemeClr val="phClr"/>
+        </a:solidFill>
+        <a:gradFill rotWithShape="1">
+          <a:gsLst>
+            <a:gs pos="0">
+              <a:schemeClr val="phClr">
+                <a:lumMod val="110000"/>
+                <a:satMod val="105000"/>
+                <a:tint val="67000"/>
+              </a:schemeClr>
+            </a:gs>
+            <a:gs pos="50000">
+              <a:schemeClr val="phClr">
+                <a:lumMod val="105000"/>
+                <a:satMod val="103000"/>
+                <a:tint val="73000"/>
+              </a:schemeClr>
+            </a:gs>
+            <a:gs pos="100000">
+              <a:schemeClr val="phClr">
+                <a:lumMod val="105000"/>
+                <a:satMod val="109000"/>
+                <a:tint val="81000"/>
+              </a:schemeClr>
+            </a:gs>
+          </a:gsLst>
+          <a:lin ang="5400000" scaled="0"/>
+        </a:gradFill>
+        <a:gradFill rotWithShape="1">
+          <a:gsLst>
+            <a:gs pos="0">
+              <a:schemeClr val="phClr">
+                <a:satMod val="103000"/>
+                <a:lumMod val="102000"/>
+                <a:tint val="94000"/>
+              </a:schemeClr>
+            </a:gs>
+            <a:gs pos="50000">
+              <a:schemeClr val="phClr">
+                <a:satMod val="110000"/>
+                <a:lumMod val="100000"/>
+                <a:shade val="100000"/>
+              </a:schemeClr>
+            </a:gs>
+            <a:gs pos="100000">
+              <a:schemeClr val="phClr">
+                <a:lumMod val="99000"/>
+                <a:satMod val="120000"/>
+                <a:shade val="78000"/>
+              </a:schemeClr>
+            </a:gs>
+          </a:gsLst>
+          <a:lin ang="5400000" scaled="0"/>
+        </a:gradFill>
+      </a:fillStyleLst>
+      <a:lnStyleLst>
+        <a:ln w="12700" cap="flat" cmpd="sng" algn="ctr">
+          <a:solidFill>
+            <a:schemeClr val="phClr"/>
+          </a:solidFill>
+          <a:prstDash val="solid"/>
+          <a:miter lim="800000"/>
+        </a:ln>
+        <a:ln w="19050" cap="flat" cmpd="sng" algn="ctr">
+          <a:solidFill>
+            <a:schemeClr val="phClr"/>
+          </a:solidFill>
+          <a:prstDash val="solid"/>
+          <a:miter lim="800000"/>
+        </a:ln>
+        <a:ln w="25400" cap="flat" cmpd="sng" algn="ctr">
+          <a:solidFill>
+            <a:schemeClr val="phClr"/>
+          </a:solidFill>
+          <a:prstDash val="solid"/>
+          <a:miter lim="800000"/>
+        </a:ln>
+      </a:lnStyleLst>
+      <a:effectStyleLst>
+        <a:effectStyle>
+          <a:effectLst/>
+        </a:effectStyle>
+        <a:effectStyle>
+          <a:effectLst/>
+        </a:effectStyle>
+        <a:effectStyle>
+          <a:effectLst>
+            <a:outerShdw blurRad="57150" dist="19050" dir="5400000" algn="ctr" rotWithShape="0">
+              <a:srgbClr val="000000">
+                <a:alpha val="63000"/>
+              </a:srgbClr>
+            </a:outerShdw>
+          </a:effectLst>
+        </a:effectStyle>
+      </a:effectStyleLst>
+      <a:bgFillStyleLst>
+        <a:solidFill>
+          <a:schemeClr val="phClr"/>
+        </a:solidFill>
+        <a:solidFill>
+          <a:schemeClr val="phClr">
+            <a:tint val="95000"/>
+            <a:satMod val="170000"/>
+          </a:schemeClr>
+        </a:solidFill>
+        <a:gradFill rotWithShape="1">
+          <a:gsLst>
+            <a:gs pos="0">
+              <a:schemeClr val="phClr">
+                <a:tint val="93000"/>
+                <a:satMod val="150000"/>
+                <a:shade val="98000"/>
+                <a:lumMod val="102000"/>
+              </a:schemeClr>
+            </a:gs>
+            <a:gs pos="50000">
+              <a:schemeClr val="phClr">
+                <a:tint val="98000"/>
+                <a:satMod val="130000"/>
+                <a:shade val="90000"/>
+                <a:lumMod val="103000"/>
+              </a:schemeClr>
+            </a:gs>
+            <a:gs pos="100000">
+              <a:schemeClr val="phClr">
+                <a:shade val="63000"/>
+                <a:satMod val="120000"/>
+              </a:schemeClr>
+            </a:gs>
+          </a:gsLst>
+          <a:lin ang="5400000" scaled="0"/>
+        </a:gradFill>
+      </a:bgFillStyleLst>
+    </a:fmtScheme>
+  </a:themeElements>
+  <a:objectDefaults>
+    <a:lnDef>
+      <a:spPr/>
+      <a:bodyPr/>
+      <a:lstStyle/>
+      <a:style>
+        <a:lnRef idx="2">
+          <a:schemeClr val="accent1"/>
+        </a:lnRef>
+        <a:fillRef idx="0">
+          <a:schemeClr val="accent1"/>
+        </a:fillRef>
+        <a:effectRef idx="1">
+          <a:schemeClr val="accent1"/>
+        </a:effectRef>
+        <a:fontRef idx="minor">
+          <a:schemeClr val="tx1"/>
+        </a:fontRef>
+      </a:style>
+    </a:lnDef>
+  </a:objectDefaults>
+  <a:extraClrSchemeLst/>
+  <a:extLst>
+    <a:ext uri="{05A4C25C-085E-4340-85A3-A5531E510DB2}">
+      <thm15:themeFamily xmlns:thm15="http://schemas.microsoft.com/office/thememl/2012/main" name="Office Theme" id="{2E142A2C-CD16-42D6-873A-C26D2A0506FA}" vid="{1BDDFF52-6CD6-40A5-AB3C-68EB2F1E4D0A}"/>
+    </a:ext>
+  </a:extLst>
+</a:theme>
 </file>
</xml_diff>